<commit_message>
A powerpoint folytatása, az odalakról a képek kellenek még
</commit_message>
<xml_diff>
--- a/ikt projektfeladat.pptx
+++ b/ikt projektfeladat.pptx
@@ -17,6 +17,12 @@
     <p:sldId id="263" r:id="rId11"/>
     <p:sldId id="264" r:id="rId12"/>
     <p:sldId id="265" r:id="rId13"/>
+    <p:sldId id="272" r:id="rId14"/>
+    <p:sldId id="268" r:id="rId15"/>
+    <p:sldId id="269" r:id="rId16"/>
+    <p:sldId id="270" r:id="rId17"/>
+    <p:sldId id="271" r:id="rId18"/>
+    <p:sldId id="273" r:id="rId19"/>
   </p:sldIdLst>
   <p:sldSz cx="12192000" cy="6858000"/>
   <p:notesSz cx="6858000" cy="9144000"/>
@@ -165,7 +171,7 @@
           </a:lstStyle>
           <a:p>
             <a:r>
-              <a:rPr lang="hu-HU" smtClean="0"/>
+              <a:rPr lang="hu-HU"/>
               <a:t>Mintacím szerkesztése</a:t>
             </a:r>
             <a:endParaRPr lang="en-US" dirty="0"/>
@@ -230,7 +236,7 @@
           </a:lstStyle>
           <a:p>
             <a:r>
-              <a:rPr lang="hu-HU" smtClean="0"/>
+              <a:rPr lang="hu-HU"/>
               <a:t>Kattintson ide az alcím mintájának szerkesztéséhez</a:t>
             </a:r>
             <a:endParaRPr lang="en-US" dirty="0"/>
@@ -254,7 +260,7 @@
           <a:p>
             <a:fld id="{38C4BF85-5AB0-4169-A990-10DF94846CFA}" type="datetimeFigureOut">
               <a:rPr lang="hu-HU" smtClean="0"/>
-              <a:t>2023.02.03.</a:t>
+              <a:t>2023. 02. 06.</a:t>
             </a:fld>
             <a:endParaRPr lang="hu-HU"/>
           </a:p>
@@ -348,7 +354,7 @@
           <a:lstStyle/>
           <a:p>
             <a:r>
-              <a:rPr lang="hu-HU" smtClean="0"/>
+              <a:rPr lang="hu-HU"/>
               <a:t>Mintacím szerkesztése</a:t>
             </a:r>
             <a:endParaRPr lang="en-US" dirty="0"/>
@@ -372,35 +378,35 @@
           <a:p>
             <a:pPr lvl="0"/>
             <a:r>
-              <a:rPr lang="hu-HU" smtClean="0"/>
+              <a:rPr lang="hu-HU"/>
               <a:t>Mintaszöveg szerkesztése</a:t>
             </a:r>
           </a:p>
           <a:p>
             <a:pPr lvl="1"/>
             <a:r>
-              <a:rPr lang="hu-HU" smtClean="0"/>
+              <a:rPr lang="hu-HU"/>
               <a:t>Második szint</a:t>
             </a:r>
           </a:p>
           <a:p>
             <a:pPr lvl="2"/>
             <a:r>
-              <a:rPr lang="hu-HU" smtClean="0"/>
+              <a:rPr lang="hu-HU"/>
               <a:t>Harmadik szint</a:t>
             </a:r>
           </a:p>
           <a:p>
             <a:pPr lvl="3"/>
             <a:r>
-              <a:rPr lang="hu-HU" smtClean="0"/>
+              <a:rPr lang="hu-HU"/>
               <a:t>Negyedik szint</a:t>
             </a:r>
           </a:p>
           <a:p>
             <a:pPr lvl="4"/>
             <a:r>
-              <a:rPr lang="hu-HU" smtClean="0"/>
+              <a:rPr lang="hu-HU"/>
               <a:t>Ötödik szint</a:t>
             </a:r>
             <a:endParaRPr lang="en-US" dirty="0"/>
@@ -424,7 +430,7 @@
           <a:p>
             <a:fld id="{38C4BF85-5AB0-4169-A990-10DF94846CFA}" type="datetimeFigureOut">
               <a:rPr lang="hu-HU" smtClean="0"/>
-              <a:t>2023.02.03.</a:t>
+              <a:t>2023. 02. 06.</a:t>
             </a:fld>
             <a:endParaRPr lang="hu-HU"/>
           </a:p>
@@ -523,7 +529,7 @@
           <a:lstStyle/>
           <a:p>
             <a:r>
-              <a:rPr lang="hu-HU" smtClean="0"/>
+              <a:rPr lang="hu-HU"/>
               <a:t>Mintacím szerkesztése</a:t>
             </a:r>
             <a:endParaRPr lang="en-US" dirty="0"/>
@@ -552,35 +558,35 @@
           <a:p>
             <a:pPr lvl="0"/>
             <a:r>
-              <a:rPr lang="hu-HU" smtClean="0"/>
+              <a:rPr lang="hu-HU"/>
               <a:t>Mintaszöveg szerkesztése</a:t>
             </a:r>
           </a:p>
           <a:p>
             <a:pPr lvl="1"/>
             <a:r>
-              <a:rPr lang="hu-HU" smtClean="0"/>
+              <a:rPr lang="hu-HU"/>
               <a:t>Második szint</a:t>
             </a:r>
           </a:p>
           <a:p>
             <a:pPr lvl="2"/>
             <a:r>
-              <a:rPr lang="hu-HU" smtClean="0"/>
+              <a:rPr lang="hu-HU"/>
               <a:t>Harmadik szint</a:t>
             </a:r>
           </a:p>
           <a:p>
             <a:pPr lvl="3"/>
             <a:r>
-              <a:rPr lang="hu-HU" smtClean="0"/>
+              <a:rPr lang="hu-HU"/>
               <a:t>Negyedik szint</a:t>
             </a:r>
           </a:p>
           <a:p>
             <a:pPr lvl="4"/>
             <a:r>
-              <a:rPr lang="hu-HU" smtClean="0"/>
+              <a:rPr lang="hu-HU"/>
               <a:t>Ötödik szint</a:t>
             </a:r>
             <a:endParaRPr lang="en-US" dirty="0"/>
@@ -604,7 +610,7 @@
           <a:p>
             <a:fld id="{38C4BF85-5AB0-4169-A990-10DF94846CFA}" type="datetimeFigureOut">
               <a:rPr lang="hu-HU" smtClean="0"/>
-              <a:t>2023.02.03.</a:t>
+              <a:t>2023. 02. 06.</a:t>
             </a:fld>
             <a:endParaRPr lang="hu-HU"/>
           </a:p>
@@ -698,7 +704,7 @@
           <a:lstStyle/>
           <a:p>
             <a:r>
-              <a:rPr lang="hu-HU" smtClean="0"/>
+              <a:rPr lang="hu-HU"/>
               <a:t>Mintacím szerkesztése</a:t>
             </a:r>
             <a:endParaRPr lang="en-US" dirty="0"/>
@@ -722,35 +728,35 @@
           <a:p>
             <a:pPr lvl="0"/>
             <a:r>
-              <a:rPr lang="hu-HU" smtClean="0"/>
+              <a:rPr lang="hu-HU"/>
               <a:t>Mintaszöveg szerkesztése</a:t>
             </a:r>
           </a:p>
           <a:p>
             <a:pPr lvl="1"/>
             <a:r>
-              <a:rPr lang="hu-HU" smtClean="0"/>
+              <a:rPr lang="hu-HU"/>
               <a:t>Második szint</a:t>
             </a:r>
           </a:p>
           <a:p>
             <a:pPr lvl="2"/>
             <a:r>
-              <a:rPr lang="hu-HU" smtClean="0"/>
+              <a:rPr lang="hu-HU"/>
               <a:t>Harmadik szint</a:t>
             </a:r>
           </a:p>
           <a:p>
             <a:pPr lvl="3"/>
             <a:r>
-              <a:rPr lang="hu-HU" smtClean="0"/>
+              <a:rPr lang="hu-HU"/>
               <a:t>Negyedik szint</a:t>
             </a:r>
           </a:p>
           <a:p>
             <a:pPr lvl="4"/>
             <a:r>
-              <a:rPr lang="hu-HU" smtClean="0"/>
+              <a:rPr lang="hu-HU"/>
               <a:t>Ötödik szint</a:t>
             </a:r>
             <a:endParaRPr lang="en-US" dirty="0"/>
@@ -774,7 +780,7 @@
           <a:p>
             <a:fld id="{38C4BF85-5AB0-4169-A990-10DF94846CFA}" type="datetimeFigureOut">
               <a:rPr lang="hu-HU" smtClean="0"/>
-              <a:t>2023.02.03.</a:t>
+              <a:t>2023. 02. 06.</a:t>
             </a:fld>
             <a:endParaRPr lang="hu-HU"/>
           </a:p>
@@ -877,7 +883,7 @@
           </a:lstStyle>
           <a:p>
             <a:r>
-              <a:rPr lang="hu-HU" smtClean="0"/>
+              <a:rPr lang="hu-HU"/>
               <a:t>Mintacím szerkesztése</a:t>
             </a:r>
             <a:endParaRPr lang="en-US" dirty="0"/>
@@ -997,7 +1003,7 @@
           <a:p>
             <a:pPr lvl="0"/>
             <a:r>
-              <a:rPr lang="hu-HU" smtClean="0"/>
+              <a:rPr lang="hu-HU"/>
               <a:t>Mintaszöveg szerkesztése</a:t>
             </a:r>
           </a:p>
@@ -1020,7 +1026,7 @@
           <a:p>
             <a:fld id="{38C4BF85-5AB0-4169-A990-10DF94846CFA}" type="datetimeFigureOut">
               <a:rPr lang="hu-HU" smtClean="0"/>
-              <a:t>2023.02.03.</a:t>
+              <a:t>2023. 02. 06.</a:t>
             </a:fld>
             <a:endParaRPr lang="hu-HU"/>
           </a:p>
@@ -1114,7 +1120,7 @@
           <a:lstStyle/>
           <a:p>
             <a:r>
-              <a:rPr lang="hu-HU" smtClean="0"/>
+              <a:rPr lang="hu-HU"/>
               <a:t>Mintacím szerkesztése</a:t>
             </a:r>
             <a:endParaRPr lang="en-US" dirty="0"/>
@@ -1143,35 +1149,35 @@
           <a:p>
             <a:pPr lvl="0"/>
             <a:r>
-              <a:rPr lang="hu-HU" smtClean="0"/>
+              <a:rPr lang="hu-HU"/>
               <a:t>Mintaszöveg szerkesztése</a:t>
             </a:r>
           </a:p>
           <a:p>
             <a:pPr lvl="1"/>
             <a:r>
-              <a:rPr lang="hu-HU" smtClean="0"/>
+              <a:rPr lang="hu-HU"/>
               <a:t>Második szint</a:t>
             </a:r>
           </a:p>
           <a:p>
             <a:pPr lvl="2"/>
             <a:r>
-              <a:rPr lang="hu-HU" smtClean="0"/>
+              <a:rPr lang="hu-HU"/>
               <a:t>Harmadik szint</a:t>
             </a:r>
           </a:p>
           <a:p>
             <a:pPr lvl="3"/>
             <a:r>
-              <a:rPr lang="hu-HU" smtClean="0"/>
+              <a:rPr lang="hu-HU"/>
               <a:t>Negyedik szint</a:t>
             </a:r>
           </a:p>
           <a:p>
             <a:pPr lvl="4"/>
             <a:r>
-              <a:rPr lang="hu-HU" smtClean="0"/>
+              <a:rPr lang="hu-HU"/>
               <a:t>Ötödik szint</a:t>
             </a:r>
             <a:endParaRPr lang="en-US" dirty="0"/>
@@ -1200,35 +1206,35 @@
           <a:p>
             <a:pPr lvl="0"/>
             <a:r>
-              <a:rPr lang="hu-HU" smtClean="0"/>
+              <a:rPr lang="hu-HU"/>
               <a:t>Mintaszöveg szerkesztése</a:t>
             </a:r>
           </a:p>
           <a:p>
             <a:pPr lvl="1"/>
             <a:r>
-              <a:rPr lang="hu-HU" smtClean="0"/>
+              <a:rPr lang="hu-HU"/>
               <a:t>Második szint</a:t>
             </a:r>
           </a:p>
           <a:p>
             <a:pPr lvl="2"/>
             <a:r>
-              <a:rPr lang="hu-HU" smtClean="0"/>
+              <a:rPr lang="hu-HU"/>
               <a:t>Harmadik szint</a:t>
             </a:r>
           </a:p>
           <a:p>
             <a:pPr lvl="3"/>
             <a:r>
-              <a:rPr lang="hu-HU" smtClean="0"/>
+              <a:rPr lang="hu-HU"/>
               <a:t>Negyedik szint</a:t>
             </a:r>
           </a:p>
           <a:p>
             <a:pPr lvl="4"/>
             <a:r>
-              <a:rPr lang="hu-HU" smtClean="0"/>
+              <a:rPr lang="hu-HU"/>
               <a:t>Ötödik szint</a:t>
             </a:r>
             <a:endParaRPr lang="en-US" dirty="0"/>
@@ -1252,7 +1258,7 @@
           <a:p>
             <a:fld id="{38C4BF85-5AB0-4169-A990-10DF94846CFA}" type="datetimeFigureOut">
               <a:rPr lang="hu-HU" smtClean="0"/>
-              <a:t>2023.02.03.</a:t>
+              <a:t>2023. 02. 06.</a:t>
             </a:fld>
             <a:endParaRPr lang="hu-HU"/>
           </a:p>
@@ -1351,7 +1357,7 @@
           <a:lstStyle/>
           <a:p>
             <a:r>
-              <a:rPr lang="hu-HU" smtClean="0"/>
+              <a:rPr lang="hu-HU"/>
               <a:t>Mintacím szerkesztése</a:t>
             </a:r>
             <a:endParaRPr lang="en-US" dirty="0"/>
@@ -1417,7 +1423,7 @@
           <a:p>
             <a:pPr lvl="0"/>
             <a:r>
-              <a:rPr lang="hu-HU" smtClean="0"/>
+              <a:rPr lang="hu-HU"/>
               <a:t>Mintaszöveg szerkesztése</a:t>
             </a:r>
           </a:p>
@@ -1445,35 +1451,35 @@
           <a:p>
             <a:pPr lvl="0"/>
             <a:r>
-              <a:rPr lang="hu-HU" smtClean="0"/>
+              <a:rPr lang="hu-HU"/>
               <a:t>Mintaszöveg szerkesztése</a:t>
             </a:r>
           </a:p>
           <a:p>
             <a:pPr lvl="1"/>
             <a:r>
-              <a:rPr lang="hu-HU" smtClean="0"/>
+              <a:rPr lang="hu-HU"/>
               <a:t>Második szint</a:t>
             </a:r>
           </a:p>
           <a:p>
             <a:pPr lvl="2"/>
             <a:r>
-              <a:rPr lang="hu-HU" smtClean="0"/>
+              <a:rPr lang="hu-HU"/>
               <a:t>Harmadik szint</a:t>
             </a:r>
           </a:p>
           <a:p>
             <a:pPr lvl="3"/>
             <a:r>
-              <a:rPr lang="hu-HU" smtClean="0"/>
+              <a:rPr lang="hu-HU"/>
               <a:t>Negyedik szint</a:t>
             </a:r>
           </a:p>
           <a:p>
             <a:pPr lvl="4"/>
             <a:r>
-              <a:rPr lang="hu-HU" smtClean="0"/>
+              <a:rPr lang="hu-HU"/>
               <a:t>Ötödik szint</a:t>
             </a:r>
             <a:endParaRPr lang="en-US" dirty="0"/>
@@ -1539,7 +1545,7 @@
           <a:p>
             <a:pPr lvl="0"/>
             <a:r>
-              <a:rPr lang="hu-HU" smtClean="0"/>
+              <a:rPr lang="hu-HU"/>
               <a:t>Mintaszöveg szerkesztése</a:t>
             </a:r>
           </a:p>
@@ -1567,35 +1573,35 @@
           <a:p>
             <a:pPr lvl="0"/>
             <a:r>
-              <a:rPr lang="hu-HU" smtClean="0"/>
+              <a:rPr lang="hu-HU"/>
               <a:t>Mintaszöveg szerkesztése</a:t>
             </a:r>
           </a:p>
           <a:p>
             <a:pPr lvl="1"/>
             <a:r>
-              <a:rPr lang="hu-HU" smtClean="0"/>
+              <a:rPr lang="hu-HU"/>
               <a:t>Második szint</a:t>
             </a:r>
           </a:p>
           <a:p>
             <a:pPr lvl="2"/>
             <a:r>
-              <a:rPr lang="hu-HU" smtClean="0"/>
+              <a:rPr lang="hu-HU"/>
               <a:t>Harmadik szint</a:t>
             </a:r>
           </a:p>
           <a:p>
             <a:pPr lvl="3"/>
             <a:r>
-              <a:rPr lang="hu-HU" smtClean="0"/>
+              <a:rPr lang="hu-HU"/>
               <a:t>Negyedik szint</a:t>
             </a:r>
           </a:p>
           <a:p>
             <a:pPr lvl="4"/>
             <a:r>
-              <a:rPr lang="hu-HU" smtClean="0"/>
+              <a:rPr lang="hu-HU"/>
               <a:t>Ötödik szint</a:t>
             </a:r>
             <a:endParaRPr lang="en-US" dirty="0"/>
@@ -1619,7 +1625,7 @@
           <a:p>
             <a:fld id="{38C4BF85-5AB0-4169-A990-10DF94846CFA}" type="datetimeFigureOut">
               <a:rPr lang="hu-HU" smtClean="0"/>
-              <a:t>2023.02.03.</a:t>
+              <a:t>2023. 02. 06.</a:t>
             </a:fld>
             <a:endParaRPr lang="hu-HU"/>
           </a:p>
@@ -1713,7 +1719,7 @@
           <a:lstStyle/>
           <a:p>
             <a:r>
-              <a:rPr lang="hu-HU" smtClean="0"/>
+              <a:rPr lang="hu-HU"/>
               <a:t>Mintacím szerkesztése</a:t>
             </a:r>
             <a:endParaRPr lang="en-US" dirty="0"/>
@@ -1737,7 +1743,7 @@
           <a:p>
             <a:fld id="{38C4BF85-5AB0-4169-A990-10DF94846CFA}" type="datetimeFigureOut">
               <a:rPr lang="hu-HU" smtClean="0"/>
-              <a:t>2023.02.03.</a:t>
+              <a:t>2023. 02. 06.</a:t>
             </a:fld>
             <a:endParaRPr lang="hu-HU"/>
           </a:p>
@@ -1832,7 +1838,7 @@
           <a:p>
             <a:fld id="{38C4BF85-5AB0-4169-A990-10DF94846CFA}" type="datetimeFigureOut">
               <a:rPr lang="hu-HU" smtClean="0"/>
-              <a:t>2023.02.03.</a:t>
+              <a:t>2023. 02. 06.</a:t>
             </a:fld>
             <a:endParaRPr lang="hu-HU"/>
           </a:p>
@@ -1935,7 +1941,7 @@
           </a:lstStyle>
           <a:p>
             <a:r>
-              <a:rPr lang="hu-HU" smtClean="0"/>
+              <a:rPr lang="hu-HU"/>
               <a:t>Mintacím szerkesztése</a:t>
             </a:r>
             <a:endParaRPr lang="en-US" dirty="0"/>
@@ -1992,35 +1998,35 @@
           <a:p>
             <a:pPr lvl="0"/>
             <a:r>
-              <a:rPr lang="hu-HU" smtClean="0"/>
+              <a:rPr lang="hu-HU"/>
               <a:t>Mintaszöveg szerkesztése</a:t>
             </a:r>
           </a:p>
           <a:p>
             <a:pPr lvl="1"/>
             <a:r>
-              <a:rPr lang="hu-HU" smtClean="0"/>
+              <a:rPr lang="hu-HU"/>
               <a:t>Második szint</a:t>
             </a:r>
           </a:p>
           <a:p>
             <a:pPr lvl="2"/>
             <a:r>
-              <a:rPr lang="hu-HU" smtClean="0"/>
+              <a:rPr lang="hu-HU"/>
               <a:t>Harmadik szint</a:t>
             </a:r>
           </a:p>
           <a:p>
             <a:pPr lvl="3"/>
             <a:r>
-              <a:rPr lang="hu-HU" smtClean="0"/>
+              <a:rPr lang="hu-HU"/>
               <a:t>Negyedik szint</a:t>
             </a:r>
           </a:p>
           <a:p>
             <a:pPr lvl="4"/>
             <a:r>
-              <a:rPr lang="hu-HU" smtClean="0"/>
+              <a:rPr lang="hu-HU"/>
               <a:t>Ötödik szint</a:t>
             </a:r>
             <a:endParaRPr lang="en-US" dirty="0"/>
@@ -2086,7 +2092,7 @@
           <a:p>
             <a:pPr lvl="0"/>
             <a:r>
-              <a:rPr lang="hu-HU" smtClean="0"/>
+              <a:rPr lang="hu-HU"/>
               <a:t>Mintaszöveg szerkesztése</a:t>
             </a:r>
           </a:p>
@@ -2109,7 +2115,7 @@
           <a:p>
             <a:fld id="{38C4BF85-5AB0-4169-A990-10DF94846CFA}" type="datetimeFigureOut">
               <a:rPr lang="hu-HU" smtClean="0"/>
-              <a:t>2023.02.03.</a:t>
+              <a:t>2023. 02. 06.</a:t>
             </a:fld>
             <a:endParaRPr lang="hu-HU"/>
           </a:p>
@@ -2212,7 +2218,7 @@
           </a:lstStyle>
           <a:p>
             <a:r>
-              <a:rPr lang="hu-HU" smtClean="0"/>
+              <a:rPr lang="hu-HU"/>
               <a:t>Mintacím szerkesztése</a:t>
             </a:r>
             <a:endParaRPr lang="en-US" dirty="0"/>
@@ -2277,7 +2283,7 @@
           </a:lstStyle>
           <a:p>
             <a:r>
-              <a:rPr lang="hu-HU" smtClean="0"/>
+              <a:rPr lang="hu-HU"/>
               <a:t>Kép beszúrásához kattintson az ikonra</a:t>
             </a:r>
             <a:endParaRPr lang="en-US" dirty="0"/>
@@ -2343,7 +2349,7 @@
           <a:p>
             <a:pPr lvl="0"/>
             <a:r>
-              <a:rPr lang="hu-HU" smtClean="0"/>
+              <a:rPr lang="hu-HU"/>
               <a:t>Mintaszöveg szerkesztése</a:t>
             </a:r>
           </a:p>
@@ -2366,7 +2372,7 @@
           <a:p>
             <a:fld id="{38C4BF85-5AB0-4169-A990-10DF94846CFA}" type="datetimeFigureOut">
               <a:rPr lang="hu-HU" smtClean="0"/>
-              <a:t>2023.02.03.</a:t>
+              <a:t>2023. 02. 06.</a:t>
             </a:fld>
             <a:endParaRPr lang="hu-HU"/>
           </a:p>
@@ -2475,7 +2481,7 @@
           <a:lstStyle/>
           <a:p>
             <a:r>
-              <a:rPr lang="hu-HU" smtClean="0"/>
+              <a:rPr lang="hu-HU"/>
               <a:t>Mintacím szerkesztése</a:t>
             </a:r>
             <a:endParaRPr lang="en-US" dirty="0"/>
@@ -2509,35 +2515,35 @@
           <a:p>
             <a:pPr lvl="0"/>
             <a:r>
-              <a:rPr lang="hu-HU" smtClean="0"/>
+              <a:rPr lang="hu-HU"/>
               <a:t>Mintaszöveg szerkesztése</a:t>
             </a:r>
           </a:p>
           <a:p>
             <a:pPr lvl="1"/>
             <a:r>
-              <a:rPr lang="hu-HU" smtClean="0"/>
+              <a:rPr lang="hu-HU"/>
               <a:t>Második szint</a:t>
             </a:r>
           </a:p>
           <a:p>
             <a:pPr lvl="2"/>
             <a:r>
-              <a:rPr lang="hu-HU" smtClean="0"/>
+              <a:rPr lang="hu-HU"/>
               <a:t>Harmadik szint</a:t>
             </a:r>
           </a:p>
           <a:p>
             <a:pPr lvl="3"/>
             <a:r>
-              <a:rPr lang="hu-HU" smtClean="0"/>
+              <a:rPr lang="hu-HU"/>
               <a:t>Negyedik szint</a:t>
             </a:r>
           </a:p>
           <a:p>
             <a:pPr lvl="4"/>
             <a:r>
-              <a:rPr lang="hu-HU" smtClean="0"/>
+              <a:rPr lang="hu-HU"/>
               <a:t>Ötödik szint</a:t>
             </a:r>
             <a:endParaRPr lang="en-US" dirty="0"/>
@@ -2579,7 +2585,7 @@
           <a:p>
             <a:fld id="{38C4BF85-5AB0-4169-A990-10DF94846CFA}" type="datetimeFigureOut">
               <a:rPr lang="hu-HU" smtClean="0"/>
-              <a:t>2023.02.03.</a:t>
+              <a:t>2023. 02. 06.</a:t>
             </a:fld>
             <a:endParaRPr lang="hu-HU"/>
           </a:p>
@@ -3013,7 +3019,7 @@
           <a:lstStyle/>
           <a:p>
             <a:r>
-              <a:rPr lang="hu-HU" b="1" cap="small" dirty="0" err="1" smtClean="0">
+              <a:rPr lang="hu-HU" b="1" cap="small" dirty="0" err="1">
                 <a:solidFill>
                   <a:srgbClr val="FFB562"/>
                 </a:solidFill>
@@ -3023,16 +3029,6 @@
               <a:t>ikt</a:t>
             </a:r>
             <a:r>
-              <a:rPr lang="hu-HU" b="1" cap="small" dirty="0" smtClean="0">
-                <a:solidFill>
-                  <a:srgbClr val="FFB562"/>
-                </a:solidFill>
-                <a:latin typeface="Inter"/>
-                <a:cs typeface="Arial" panose="020B0604020202020204" pitchFamily="34" charset="0"/>
-              </a:rPr>
-              <a:t> </a:t>
-            </a:r>
-            <a:r>
               <a:rPr lang="hu-HU" b="1" cap="small" dirty="0">
                 <a:solidFill>
                   <a:srgbClr val="FFB562"/>
@@ -3040,25 +3036,8 @@
                 <a:latin typeface="Inter"/>
                 <a:cs typeface="Arial" panose="020B0604020202020204" pitchFamily="34" charset="0"/>
               </a:rPr>
-              <a:t>p</a:t>
-            </a:r>
-            <a:r>
-              <a:rPr lang="hu-HU" b="1" cap="small" dirty="0" smtClean="0">
-                <a:solidFill>
-                  <a:srgbClr val="FFB562"/>
-                </a:solidFill>
-                <a:latin typeface="Inter"/>
-                <a:cs typeface="Arial" panose="020B0604020202020204" pitchFamily="34" charset="0"/>
-              </a:rPr>
-              <a:t>rojektfeladat</a:t>
-            </a:r>
-            <a:endParaRPr lang="hu-HU" b="1" cap="small" dirty="0">
-              <a:solidFill>
-                <a:srgbClr val="FFB562"/>
-              </a:solidFill>
-              <a:latin typeface="Inter"/>
-              <a:cs typeface="Arial" panose="020B0604020202020204" pitchFamily="34" charset="0"/>
-            </a:endParaRPr>
+              <a:t> projektfeladat</a:t>
+            </a:r>
           </a:p>
         </p:txBody>
       </p:sp>
@@ -3083,7 +3062,7 @@
           <a:lstStyle/>
           <a:p>
             <a:r>
-              <a:rPr lang="hu-HU" dirty="0" smtClean="0">
+              <a:rPr lang="hu-HU" dirty="0">
                 <a:solidFill>
                   <a:srgbClr val="F87474"/>
                 </a:solidFill>
@@ -3092,13 +3071,6 @@
               </a:rPr>
               <a:t>Készítők: Beréti Zsófia, Császár András, Kulimák Máté</a:t>
             </a:r>
-            <a:endParaRPr lang="hu-HU" dirty="0">
-              <a:solidFill>
-                <a:srgbClr val="F87474"/>
-              </a:solidFill>
-              <a:latin typeface="Arial" panose="020B0604020202020204" pitchFamily="34" charset="0"/>
-              <a:cs typeface="Arial" panose="020B0604020202020204" pitchFamily="34" charset="0"/>
-            </a:endParaRPr>
           </a:p>
         </p:txBody>
       </p:sp>
@@ -3112,21 +3084,6 @@
   <p:clrMapOvr>
     <a:masterClrMapping/>
   </p:clrMapOvr>
-  <mc:AlternateContent xmlns:mc="http://schemas.openxmlformats.org/markup-compatibility/2006" xmlns:p14="http://schemas.microsoft.com/office/powerpoint/2010/main">
-    <mc:Choice Requires="p14">
-      <p:transition p14:dur="0"/>
-    </mc:Choice>
-    <mc:Fallback xmlns="">
-      <p:transition/>
-    </mc:Fallback>
-  </mc:AlternateContent>
-  <p:timing>
-    <p:tnLst>
-      <p:par>
-        <p:cTn id="1" dur="indefinite" restart="never" nodeType="tmRoot"/>
-      </p:par>
-    </p:tnLst>
-  </p:timing>
 </p:sld>
 </file>
 
@@ -3171,7 +3128,7 @@
           <a:p>
             <a:pPr algn="ctr"/>
             <a:r>
-              <a:rPr lang="hu-HU" b="1" cap="small" dirty="0" smtClean="0">
+              <a:rPr lang="hu-HU" b="1" cap="small" dirty="0">
                 <a:solidFill>
                   <a:srgbClr val="FFB562"/>
                 </a:solidFill>
@@ -3180,13 +3137,6 @@
               </a:rPr>
               <a:t>Kulimákok</a:t>
             </a:r>
-            <a:endParaRPr lang="hu-HU" b="1" cap="small" dirty="0">
-              <a:solidFill>
-                <a:srgbClr val="FFB562"/>
-              </a:solidFill>
-              <a:latin typeface="Arial" panose="020B0604020202020204" pitchFamily="34" charset="0"/>
-              <a:cs typeface="Arial" panose="020B0604020202020204" pitchFamily="34" charset="0"/>
-            </a:endParaRPr>
           </a:p>
         </p:txBody>
       </p:sp>
@@ -3219,21 +3169,6 @@
   <p:clrMapOvr>
     <a:masterClrMapping/>
   </p:clrMapOvr>
-  <mc:AlternateContent xmlns:mc="http://schemas.openxmlformats.org/markup-compatibility/2006" xmlns:p14="http://schemas.microsoft.com/office/powerpoint/2010/main">
-    <mc:Choice Requires="p14">
-      <p:transition p14:dur="0"/>
-    </mc:Choice>
-    <mc:Fallback xmlns="">
-      <p:transition/>
-    </mc:Fallback>
-  </mc:AlternateContent>
-  <p:timing>
-    <p:tnLst>
-      <p:par>
-        <p:cTn id="1" dur="indefinite" restart="never" nodeType="tmRoot"/>
-      </p:par>
-    </p:tnLst>
-  </p:timing>
 </p:sld>
 </file>
 
@@ -3278,7 +3213,7 @@
           <a:p>
             <a:pPr algn="ctr"/>
             <a:r>
-              <a:rPr lang="hu-HU" b="1" cap="small" dirty="0" smtClean="0">
+              <a:rPr lang="hu-HU" b="1" cap="small" dirty="0">
                 <a:solidFill>
                   <a:srgbClr val="FFB562"/>
                 </a:solidFill>
@@ -3287,13 +3222,6 @@
               </a:rPr>
               <a:t>Gomb</a:t>
             </a:r>
-            <a:endParaRPr lang="hu-HU" b="1" cap="small" dirty="0">
-              <a:solidFill>
-                <a:srgbClr val="FFB562"/>
-              </a:solidFill>
-              <a:latin typeface="Arial" panose="020B0604020202020204" pitchFamily="34" charset="0"/>
-              <a:cs typeface="Arial" panose="020B0604020202020204" pitchFamily="34" charset="0"/>
-            </a:endParaRPr>
           </a:p>
         </p:txBody>
       </p:sp>
@@ -3326,21 +3254,6 @@
   <p:clrMapOvr>
     <a:masterClrMapping/>
   </p:clrMapOvr>
-  <mc:AlternateContent xmlns:mc="http://schemas.openxmlformats.org/markup-compatibility/2006" xmlns:p14="http://schemas.microsoft.com/office/powerpoint/2010/main">
-    <mc:Choice Requires="p14">
-      <p:transition p14:dur="0"/>
-    </mc:Choice>
-    <mc:Fallback xmlns="">
-      <p:transition/>
-    </mc:Fallback>
-  </mc:AlternateContent>
-  <p:timing>
-    <p:tnLst>
-      <p:par>
-        <p:cTn id="1" dur="indefinite" restart="never" nodeType="tmRoot"/>
-      </p:par>
-    </p:tnLst>
-  </p:timing>
 </p:sld>
 </file>
 
@@ -3385,7 +3298,7 @@
           <a:p>
             <a:pPr algn="ctr"/>
             <a:r>
-              <a:rPr lang="hu-HU" b="1" cap="small" dirty="0" smtClean="0">
+              <a:rPr lang="hu-HU" b="1" cap="small" dirty="0">
                 <a:solidFill>
                   <a:srgbClr val="FFB562"/>
                 </a:solidFill>
@@ -3394,13 +3307,6 @@
               </a:rPr>
               <a:t>Rólunk</a:t>
             </a:r>
-            <a:endParaRPr lang="hu-HU" b="1" cap="small" dirty="0">
-              <a:solidFill>
-                <a:srgbClr val="FFB562"/>
-              </a:solidFill>
-              <a:latin typeface="Arial" panose="020B0604020202020204" pitchFamily="34" charset="0"/>
-              <a:cs typeface="Arial" panose="020B0604020202020204" pitchFamily="34" charset="0"/>
-            </a:endParaRPr>
           </a:p>
         </p:txBody>
       </p:sp>
@@ -3433,21 +3339,629 @@
   <p:clrMapOvr>
     <a:masterClrMapping/>
   </p:clrMapOvr>
-  <mc:AlternateContent xmlns:mc="http://schemas.openxmlformats.org/markup-compatibility/2006" xmlns:p14="http://schemas.microsoft.com/office/powerpoint/2010/main">
-    <mc:Choice Requires="p14">
-      <p:transition p14:dur="0"/>
-    </mc:Choice>
-    <mc:Fallback xmlns="">
-      <p:transition/>
-    </mc:Fallback>
-  </mc:AlternateContent>
-  <p:timing>
-    <p:tnLst>
-      <p:par>
-        <p:cTn id="1" dur="indefinite" restart="never" nodeType="tmRoot"/>
-      </p:par>
-    </p:tnLst>
-  </p:timing>
+</p:sld>
+</file>
+
+<file path=ppt/slides/slide13.xml><?xml version="1.0" encoding="utf-8"?>
+<p:sld xmlns:a="http://schemas.openxmlformats.org/drawingml/2006/main" xmlns:r="http://schemas.openxmlformats.org/officeDocument/2006/relationships" xmlns:p="http://schemas.openxmlformats.org/presentationml/2006/main">
+  <p:cSld>
+    <p:spTree>
+      <p:nvGrpSpPr>
+        <p:cNvPr id="1" name=""/>
+        <p:cNvGrpSpPr/>
+        <p:nvPr/>
+      </p:nvGrpSpPr>
+      <p:grpSpPr>
+        <a:xfrm>
+          <a:off x="0" y="0"/>
+          <a:ext cx="0" cy="0"/>
+          <a:chOff x="0" y="0"/>
+          <a:chExt cx="0" cy="0"/>
+        </a:xfrm>
+      </p:grpSpPr>
+      <p:sp>
+        <p:nvSpPr>
+          <p:cNvPr id="2" name="Cím 1"/>
+          <p:cNvSpPr>
+            <a:spLocks noGrp="1"/>
+          </p:cNvSpPr>
+          <p:nvPr>
+            <p:ph type="title"/>
+          </p:nvPr>
+        </p:nvSpPr>
+        <p:spPr>
+          <a:xfrm>
+            <a:off x="939800" y="2745468"/>
+            <a:ext cx="10515600" cy="1325563"/>
+          </a:xfrm>
+        </p:spPr>
+        <p:txBody>
+          <a:bodyPr>
+            <a:normAutofit fontScale="90000"/>
+          </a:bodyPr>
+          <a:lstStyle/>
+          <a:p>
+            <a:pPr algn="ctr"/>
+            <a:r>
+              <a:rPr lang="hu-HU" sz="8000" b="1" cap="small" dirty="0">
+                <a:solidFill>
+                  <a:srgbClr val="FFB562"/>
+                </a:solidFill>
+                <a:latin typeface="Arial" panose="020B0604020202020204" pitchFamily="34" charset="0"/>
+                <a:cs typeface="Arial" panose="020B0604020202020204" pitchFamily="34" charset="0"/>
+              </a:rPr>
+              <a:t>És hogy ki mit csinált?</a:t>
+            </a:r>
+          </a:p>
+        </p:txBody>
+      </p:sp>
+    </p:spTree>
+    <p:extLst>
+      <p:ext uri="{BB962C8B-B14F-4D97-AF65-F5344CB8AC3E}">
+        <p14:creationId xmlns:p14="http://schemas.microsoft.com/office/powerpoint/2010/main" val="1330260523"/>
+      </p:ext>
+    </p:extLst>
+  </p:cSld>
+  <p:clrMapOvr>
+    <a:masterClrMapping/>
+  </p:clrMapOvr>
+</p:sld>
+</file>
+
+<file path=ppt/slides/slide14.xml><?xml version="1.0" encoding="utf-8"?>
+<p:sld xmlns:a="http://schemas.openxmlformats.org/drawingml/2006/main" xmlns:r="http://schemas.openxmlformats.org/officeDocument/2006/relationships" xmlns:p="http://schemas.openxmlformats.org/presentationml/2006/main">
+  <p:cSld>
+    <p:spTree>
+      <p:nvGrpSpPr>
+        <p:cNvPr id="1" name=""/>
+        <p:cNvGrpSpPr/>
+        <p:nvPr/>
+      </p:nvGrpSpPr>
+      <p:grpSpPr>
+        <a:xfrm>
+          <a:off x="0" y="0"/>
+          <a:ext cx="0" cy="0"/>
+          <a:chOff x="0" y="0"/>
+          <a:chExt cx="0" cy="0"/>
+        </a:xfrm>
+      </p:grpSpPr>
+      <p:sp>
+        <p:nvSpPr>
+          <p:cNvPr id="2" name="Cím 1"/>
+          <p:cNvSpPr>
+            <a:spLocks noGrp="1"/>
+          </p:cNvSpPr>
+          <p:nvPr>
+            <p:ph type="title"/>
+          </p:nvPr>
+        </p:nvSpPr>
+        <p:spPr>
+          <a:xfrm>
+            <a:off x="809171" y="595085"/>
+            <a:ext cx="10515600" cy="776288"/>
+          </a:xfrm>
+        </p:spPr>
+        <p:txBody>
+          <a:bodyPr>
+            <a:normAutofit/>
+          </a:bodyPr>
+          <a:lstStyle/>
+          <a:p>
+            <a:pPr algn="ctr"/>
+            <a:r>
+              <a:rPr lang="hu-HU" b="1" cap="small" dirty="0">
+                <a:solidFill>
+                  <a:srgbClr val="FFB562"/>
+                </a:solidFill>
+                <a:latin typeface="Arial" panose="020B0604020202020204" pitchFamily="34" charset="0"/>
+                <a:cs typeface="Arial" panose="020B0604020202020204" pitchFamily="34" charset="0"/>
+              </a:rPr>
+              <a:t>Beréti Zsófia része a projektben</a:t>
+            </a:r>
+          </a:p>
+        </p:txBody>
+      </p:sp>
+      <p:sp>
+        <p:nvSpPr>
+          <p:cNvPr id="3" name="Tartalom helye 2"/>
+          <p:cNvSpPr>
+            <a:spLocks noGrp="1"/>
+          </p:cNvSpPr>
+          <p:nvPr>
+            <p:ph idx="1"/>
+          </p:nvPr>
+        </p:nvSpPr>
+        <p:spPr/>
+        <p:txBody>
+          <a:bodyPr/>
+          <a:lstStyle/>
+          <a:p>
+            <a:endParaRPr lang="hu-HU"/>
+          </a:p>
+        </p:txBody>
+      </p:sp>
+    </p:spTree>
+    <p:extLst>
+      <p:ext uri="{BB962C8B-B14F-4D97-AF65-F5344CB8AC3E}">
+        <p14:creationId xmlns:p14="http://schemas.microsoft.com/office/powerpoint/2010/main" val="2605798914"/>
+      </p:ext>
+    </p:extLst>
+  </p:cSld>
+  <p:clrMapOvr>
+    <a:masterClrMapping/>
+  </p:clrMapOvr>
+</p:sld>
+</file>
+
+<file path=ppt/slides/slide15.xml><?xml version="1.0" encoding="utf-8"?>
+<p:sld xmlns:a="http://schemas.openxmlformats.org/drawingml/2006/main" xmlns:r="http://schemas.openxmlformats.org/officeDocument/2006/relationships" xmlns:p="http://schemas.openxmlformats.org/presentationml/2006/main">
+  <p:cSld>
+    <p:spTree>
+      <p:nvGrpSpPr>
+        <p:cNvPr id="1" name=""/>
+        <p:cNvGrpSpPr/>
+        <p:nvPr/>
+      </p:nvGrpSpPr>
+      <p:grpSpPr>
+        <a:xfrm>
+          <a:off x="0" y="0"/>
+          <a:ext cx="0" cy="0"/>
+          <a:chOff x="0" y="0"/>
+          <a:chExt cx="0" cy="0"/>
+        </a:xfrm>
+      </p:grpSpPr>
+      <p:sp>
+        <p:nvSpPr>
+          <p:cNvPr id="2" name="Cím 1"/>
+          <p:cNvSpPr>
+            <a:spLocks noGrp="1"/>
+          </p:cNvSpPr>
+          <p:nvPr>
+            <p:ph type="title"/>
+          </p:nvPr>
+        </p:nvSpPr>
+        <p:spPr>
+          <a:xfrm>
+            <a:off x="809171" y="595085"/>
+            <a:ext cx="10515600" cy="776288"/>
+          </a:xfrm>
+        </p:spPr>
+        <p:txBody>
+          <a:bodyPr>
+            <a:normAutofit/>
+          </a:bodyPr>
+          <a:lstStyle/>
+          <a:p>
+            <a:pPr algn="ctr"/>
+            <a:r>
+              <a:rPr lang="hu-HU" b="1" cap="small" dirty="0">
+                <a:solidFill>
+                  <a:srgbClr val="FFB562"/>
+                </a:solidFill>
+                <a:latin typeface="Arial" panose="020B0604020202020204" pitchFamily="34" charset="0"/>
+                <a:cs typeface="Arial" panose="020B0604020202020204" pitchFamily="34" charset="0"/>
+              </a:rPr>
+              <a:t>Császár Andris része a projektben</a:t>
+            </a:r>
+          </a:p>
+        </p:txBody>
+      </p:sp>
+      <p:sp>
+        <p:nvSpPr>
+          <p:cNvPr id="3" name="Tartalom helye 2"/>
+          <p:cNvSpPr>
+            <a:spLocks noGrp="1"/>
+          </p:cNvSpPr>
+          <p:nvPr>
+            <p:ph idx="1"/>
+          </p:nvPr>
+        </p:nvSpPr>
+        <p:spPr/>
+        <p:txBody>
+          <a:bodyPr/>
+          <a:lstStyle/>
+          <a:p>
+            <a:endParaRPr lang="hu-HU"/>
+          </a:p>
+        </p:txBody>
+      </p:sp>
+    </p:spTree>
+    <p:extLst>
+      <p:ext uri="{BB962C8B-B14F-4D97-AF65-F5344CB8AC3E}">
+        <p14:creationId xmlns:p14="http://schemas.microsoft.com/office/powerpoint/2010/main" val="1252547542"/>
+      </p:ext>
+    </p:extLst>
+  </p:cSld>
+  <p:clrMapOvr>
+    <a:masterClrMapping/>
+  </p:clrMapOvr>
+</p:sld>
+</file>
+
+<file path=ppt/slides/slide16.xml><?xml version="1.0" encoding="utf-8"?>
+<p:sld xmlns:a="http://schemas.openxmlformats.org/drawingml/2006/main" xmlns:r="http://schemas.openxmlformats.org/officeDocument/2006/relationships" xmlns:p="http://schemas.openxmlformats.org/presentationml/2006/main">
+  <p:cSld>
+    <p:spTree>
+      <p:nvGrpSpPr>
+        <p:cNvPr id="1" name=""/>
+        <p:cNvGrpSpPr/>
+        <p:nvPr/>
+      </p:nvGrpSpPr>
+      <p:grpSpPr>
+        <a:xfrm>
+          <a:off x="0" y="0"/>
+          <a:ext cx="0" cy="0"/>
+          <a:chOff x="0" y="0"/>
+          <a:chExt cx="0" cy="0"/>
+        </a:xfrm>
+      </p:grpSpPr>
+      <p:sp>
+        <p:nvSpPr>
+          <p:cNvPr id="2" name="Cím 1"/>
+          <p:cNvSpPr>
+            <a:spLocks noGrp="1"/>
+          </p:cNvSpPr>
+          <p:nvPr>
+            <p:ph type="title"/>
+          </p:nvPr>
+        </p:nvSpPr>
+        <p:spPr>
+          <a:xfrm>
+            <a:off x="809171" y="595085"/>
+            <a:ext cx="10515600" cy="776288"/>
+          </a:xfrm>
+        </p:spPr>
+        <p:txBody>
+          <a:bodyPr>
+            <a:normAutofit/>
+          </a:bodyPr>
+          <a:lstStyle/>
+          <a:p>
+            <a:pPr algn="ctr"/>
+            <a:r>
+              <a:rPr lang="hu-HU" b="1" cap="small" dirty="0">
+                <a:solidFill>
+                  <a:srgbClr val="FFB562"/>
+                </a:solidFill>
+                <a:latin typeface="Arial" panose="020B0604020202020204" pitchFamily="34" charset="0"/>
+                <a:cs typeface="Arial" panose="020B0604020202020204" pitchFamily="34" charset="0"/>
+              </a:rPr>
+              <a:t>Kulimák Máté része a projektben</a:t>
+            </a:r>
+          </a:p>
+        </p:txBody>
+      </p:sp>
+      <p:sp>
+        <p:nvSpPr>
+          <p:cNvPr id="3" name="Tartalom helye 2"/>
+          <p:cNvSpPr>
+            <a:spLocks noGrp="1"/>
+          </p:cNvSpPr>
+          <p:nvPr>
+            <p:ph idx="1"/>
+          </p:nvPr>
+        </p:nvSpPr>
+        <p:spPr>
+          <a:xfrm>
+            <a:off x="809171" y="1971041"/>
+            <a:ext cx="3081694" cy="3897913"/>
+          </a:xfrm>
+        </p:spPr>
+        <p:txBody>
+          <a:bodyPr>
+            <a:normAutofit fontScale="92500" lnSpcReduction="10000"/>
+          </a:bodyPr>
+          <a:lstStyle/>
+          <a:p>
+            <a:pPr algn="just"/>
+            <a:r>
+              <a:rPr lang="hu-HU" dirty="0">
+                <a:solidFill>
+                  <a:srgbClr val="F87474"/>
+                </a:solidFill>
+              </a:rPr>
+              <a:t>Kulimákokról képek elkészítése</a:t>
+            </a:r>
+          </a:p>
+          <a:p>
+            <a:pPr algn="just"/>
+            <a:r>
+              <a:rPr lang="hu-HU" dirty="0" err="1">
+                <a:solidFill>
+                  <a:srgbClr val="F87474"/>
+                </a:solidFill>
+              </a:rPr>
+              <a:t>Powerpoint</a:t>
+            </a:r>
+            <a:r>
+              <a:rPr lang="hu-HU" dirty="0">
+                <a:solidFill>
+                  <a:srgbClr val="F87474"/>
+                </a:solidFill>
+              </a:rPr>
+              <a:t> elkészítése</a:t>
+            </a:r>
+          </a:p>
+          <a:p>
+            <a:pPr algn="just"/>
+            <a:r>
+              <a:rPr lang="hu-HU" dirty="0">
+                <a:solidFill>
+                  <a:srgbClr val="F87474"/>
+                </a:solidFill>
+              </a:rPr>
+              <a:t>„A gomb” </a:t>
+            </a:r>
+            <a:r>
+              <a:rPr lang="hu-HU" dirty="0" err="1">
+                <a:solidFill>
+                  <a:srgbClr val="F87474"/>
+                </a:solidFill>
+              </a:rPr>
+              <a:t>desing</a:t>
+            </a:r>
+            <a:r>
+              <a:rPr lang="hu-HU" dirty="0">
+                <a:solidFill>
+                  <a:srgbClr val="F87474"/>
+                </a:solidFill>
+              </a:rPr>
+              <a:t> és váz</a:t>
+            </a:r>
+          </a:p>
+          <a:p>
+            <a:pPr algn="just"/>
+            <a:r>
+              <a:rPr lang="hu-HU" dirty="0" err="1">
+                <a:solidFill>
+                  <a:srgbClr val="F87474"/>
+                </a:solidFill>
+              </a:rPr>
+              <a:t>Kattingatós</a:t>
+            </a:r>
+            <a:r>
+              <a:rPr lang="hu-HU" dirty="0">
+                <a:solidFill>
+                  <a:srgbClr val="F87474"/>
+                </a:solidFill>
+              </a:rPr>
+              <a:t> videó</a:t>
+            </a:r>
+          </a:p>
+          <a:p>
+            <a:pPr algn="just"/>
+            <a:r>
+              <a:rPr lang="hu-HU" dirty="0">
+                <a:solidFill>
+                  <a:srgbClr val="F87474"/>
+                </a:solidFill>
+              </a:rPr>
+              <a:t>Az odalak tartalmi szövegének megírása</a:t>
+            </a:r>
+          </a:p>
+          <a:p>
+            <a:endParaRPr lang="hu-HU" dirty="0"/>
+          </a:p>
+        </p:txBody>
+      </p:sp>
+      <p:pic>
+        <p:nvPicPr>
+          <p:cNvPr id="5" name="Kép 4" descr="A képen szöveg, computer, számítógép, elektronika látható&#10;&#10;Automatikusan generált leírás">
+            <a:extLst>
+              <a:ext uri="{FF2B5EF4-FFF2-40B4-BE49-F238E27FC236}">
+                <a16:creationId xmlns:a16="http://schemas.microsoft.com/office/drawing/2014/main" id="{D03231E4-A6C9-7C1F-E138-BFB64C9149DD}"/>
+              </a:ext>
+            </a:extLst>
+          </p:cNvPr>
+          <p:cNvPicPr>
+            <a:picLocks noChangeAspect="1"/>
+          </p:cNvPicPr>
+          <p:nvPr/>
+        </p:nvPicPr>
+        <p:blipFill>
+          <a:blip r:embed="rId2" cstate="print">
+            <a:extLst>
+              <a:ext uri="{28A0092B-C50C-407E-A947-70E740481C1C}">
+                <a14:useLocalDpi xmlns:a14="http://schemas.microsoft.com/office/drawing/2010/main" val="0"/>
+              </a:ext>
+            </a:extLst>
+          </a:blip>
+          <a:stretch>
+            <a:fillRect/>
+          </a:stretch>
+        </p:blipFill>
+        <p:spPr>
+          <a:xfrm rot="5400000">
+            <a:off x="6445443" y="2087607"/>
+            <a:ext cx="4627465" cy="3470599"/>
+          </a:xfrm>
+          <a:prstGeom prst="rect">
+            <a:avLst/>
+          </a:prstGeom>
+        </p:spPr>
+      </p:pic>
+      <p:sp>
+        <p:nvSpPr>
+          <p:cNvPr id="6" name="Szövegdoboz 5">
+            <a:extLst>
+              <a:ext uri="{FF2B5EF4-FFF2-40B4-BE49-F238E27FC236}">
+                <a16:creationId xmlns:a16="http://schemas.microsoft.com/office/drawing/2014/main" id="{055B66B0-E83F-A476-5C41-79DEE57882BE}"/>
+              </a:ext>
+            </a:extLst>
+          </p:cNvPr>
+          <p:cNvSpPr txBox="1"/>
+          <p:nvPr/>
+        </p:nvSpPr>
+        <p:spPr>
+          <a:xfrm>
+            <a:off x="7023876" y="6274440"/>
+            <a:ext cx="3431452" cy="369332"/>
+          </a:xfrm>
+          <a:prstGeom prst="rect">
+            <a:avLst/>
+          </a:prstGeom>
+          <a:noFill/>
+        </p:spPr>
+        <p:txBody>
+          <a:bodyPr wrap="none" rtlCol="0">
+            <a:spAutoFit/>
+          </a:bodyPr>
+          <a:lstStyle/>
+          <a:p>
+            <a:r>
+              <a:rPr lang="hu-HU" dirty="0"/>
+              <a:t>Én ahogy csinálom a </a:t>
+            </a:r>
+            <a:r>
+              <a:rPr lang="hu-HU" dirty="0" err="1"/>
+              <a:t>powerpointot</a:t>
+            </a:r>
+            <a:endParaRPr lang="hu-HU" dirty="0"/>
+          </a:p>
+        </p:txBody>
+      </p:sp>
+    </p:spTree>
+    <p:extLst>
+      <p:ext uri="{BB962C8B-B14F-4D97-AF65-F5344CB8AC3E}">
+        <p14:creationId xmlns:p14="http://schemas.microsoft.com/office/powerpoint/2010/main" val="3444902437"/>
+      </p:ext>
+    </p:extLst>
+  </p:cSld>
+  <p:clrMapOvr>
+    <a:masterClrMapping/>
+  </p:clrMapOvr>
+</p:sld>
+</file>
+
+<file path=ppt/slides/slide17.xml><?xml version="1.0" encoding="utf-8"?>
+<p:sld xmlns:a="http://schemas.openxmlformats.org/drawingml/2006/main" xmlns:r="http://schemas.openxmlformats.org/officeDocument/2006/relationships" xmlns:p="http://schemas.openxmlformats.org/presentationml/2006/main">
+  <p:cSld>
+    <p:spTree>
+      <p:nvGrpSpPr>
+        <p:cNvPr id="1" name=""/>
+        <p:cNvGrpSpPr/>
+        <p:nvPr/>
+      </p:nvGrpSpPr>
+      <p:grpSpPr>
+        <a:xfrm>
+          <a:off x="0" y="0"/>
+          <a:ext cx="0" cy="0"/>
+          <a:chOff x="0" y="0"/>
+          <a:chExt cx="0" cy="0"/>
+        </a:xfrm>
+      </p:grpSpPr>
+      <p:sp>
+        <p:nvSpPr>
+          <p:cNvPr id="2" name="Cím 1"/>
+          <p:cNvSpPr>
+            <a:spLocks noGrp="1"/>
+          </p:cNvSpPr>
+          <p:nvPr>
+            <p:ph type="title"/>
+          </p:nvPr>
+        </p:nvSpPr>
+        <p:spPr>
+          <a:xfrm>
+            <a:off x="939800" y="2745468"/>
+            <a:ext cx="10515600" cy="1325563"/>
+          </a:xfrm>
+        </p:spPr>
+        <p:txBody>
+          <a:bodyPr>
+            <a:normAutofit fontScale="90000"/>
+          </a:bodyPr>
+          <a:lstStyle/>
+          <a:p>
+            <a:pPr algn="ctr"/>
+            <a:r>
+              <a:rPr lang="hu-HU" sz="8000" b="1" cap="small" dirty="0">
+                <a:solidFill>
+                  <a:srgbClr val="FFB562"/>
+                </a:solidFill>
+                <a:latin typeface="Arial" panose="020B0604020202020204" pitchFamily="34" charset="0"/>
+                <a:cs typeface="Arial" panose="020B0604020202020204" pitchFamily="34" charset="0"/>
+              </a:rPr>
+              <a:t>A közös munka értékelése</a:t>
+            </a:r>
+          </a:p>
+        </p:txBody>
+      </p:sp>
+    </p:spTree>
+    <p:extLst>
+      <p:ext uri="{BB962C8B-B14F-4D97-AF65-F5344CB8AC3E}">
+        <p14:creationId xmlns:p14="http://schemas.microsoft.com/office/powerpoint/2010/main" val="843378817"/>
+      </p:ext>
+    </p:extLst>
+  </p:cSld>
+  <p:clrMapOvr>
+    <a:masterClrMapping/>
+  </p:clrMapOvr>
+</p:sld>
+</file>
+
+<file path=ppt/slides/slide18.xml><?xml version="1.0" encoding="utf-8"?>
+<p:sld xmlns:a="http://schemas.openxmlformats.org/drawingml/2006/main" xmlns:r="http://schemas.openxmlformats.org/officeDocument/2006/relationships" xmlns:p="http://schemas.openxmlformats.org/presentationml/2006/main">
+  <p:cSld>
+    <p:spTree>
+      <p:nvGrpSpPr>
+        <p:cNvPr id="1" name=""/>
+        <p:cNvGrpSpPr/>
+        <p:nvPr/>
+      </p:nvGrpSpPr>
+      <p:grpSpPr>
+        <a:xfrm>
+          <a:off x="0" y="0"/>
+          <a:ext cx="0" cy="0"/>
+          <a:chOff x="0" y="0"/>
+          <a:chExt cx="0" cy="0"/>
+        </a:xfrm>
+      </p:grpSpPr>
+      <p:sp>
+        <p:nvSpPr>
+          <p:cNvPr id="2" name="Cím 1"/>
+          <p:cNvSpPr>
+            <a:spLocks noGrp="1"/>
+          </p:cNvSpPr>
+          <p:nvPr>
+            <p:ph type="title"/>
+          </p:nvPr>
+        </p:nvSpPr>
+        <p:spPr>
+          <a:xfrm>
+            <a:off x="939800" y="2745468"/>
+            <a:ext cx="10515600" cy="1325563"/>
+          </a:xfrm>
+        </p:spPr>
+        <p:txBody>
+          <a:bodyPr>
+            <a:normAutofit fontScale="90000"/>
+          </a:bodyPr>
+          <a:lstStyle/>
+          <a:p>
+            <a:pPr algn="ctr"/>
+            <a:r>
+              <a:rPr lang="hu-HU" sz="8000" b="1" cap="small" dirty="0">
+                <a:solidFill>
+                  <a:srgbClr val="FFB562"/>
+                </a:solidFill>
+                <a:latin typeface="Arial" panose="020B0604020202020204" pitchFamily="34" charset="0"/>
+                <a:cs typeface="Arial" panose="020B0604020202020204" pitchFamily="34" charset="0"/>
+              </a:rPr>
+              <a:t>Köszönjük a figyelmet!</a:t>
+            </a:r>
+          </a:p>
+        </p:txBody>
+      </p:sp>
+    </p:spTree>
+    <p:extLst>
+      <p:ext uri="{BB962C8B-B14F-4D97-AF65-F5344CB8AC3E}">
+        <p14:creationId xmlns:p14="http://schemas.microsoft.com/office/powerpoint/2010/main" val="1472350213"/>
+      </p:ext>
+    </p:extLst>
+  </p:cSld>
+  <p:clrMapOvr>
+    <a:masterClrMapping/>
+  </p:clrMapOvr>
 </p:sld>
 </file>
 
@@ -3492,7 +4006,7 @@
           <a:p>
             <a:pPr algn="ctr"/>
             <a:r>
-              <a:rPr lang="hu-HU" sz="8000" b="1" cap="small" dirty="0" smtClean="0">
+              <a:rPr lang="hu-HU" sz="8000" b="1" cap="small" dirty="0">
                 <a:solidFill>
                   <a:srgbClr val="FFB562"/>
                 </a:solidFill>
@@ -3501,13 +4015,6 @@
               </a:rPr>
               <a:t>Tervezés</a:t>
             </a:r>
-            <a:endParaRPr lang="hu-HU" sz="8000" b="1" cap="small" dirty="0">
-              <a:solidFill>
-                <a:srgbClr val="FFB562"/>
-              </a:solidFill>
-              <a:latin typeface="Arial" panose="020B0604020202020204" pitchFamily="34" charset="0"/>
-              <a:cs typeface="Arial" panose="020B0604020202020204" pitchFamily="34" charset="0"/>
-            </a:endParaRPr>
           </a:p>
         </p:txBody>
       </p:sp>
@@ -3521,13 +4028,6 @@
   <p:clrMapOvr>
     <a:masterClrMapping/>
   </p:clrMapOvr>
-  <p:timing>
-    <p:tnLst>
-      <p:par>
-        <p:cTn id="1" dur="indefinite" restart="never" nodeType="tmRoot"/>
-      </p:par>
-    </p:tnLst>
-  </p:timing>
 </p:sld>
 </file>
 
@@ -3579,25 +4079,8 @@
                 <a:latin typeface="Arial" panose="020B0604020202020204" pitchFamily="34" charset="0"/>
                 <a:cs typeface="Arial" panose="020B0604020202020204" pitchFamily="34" charset="0"/>
               </a:rPr>
-              <a:t>Sprintek </a:t>
-            </a:r>
-            <a:r>
-              <a:rPr lang="hu-HU" b="1" cap="small" dirty="0" smtClean="0">
-                <a:solidFill>
-                  <a:srgbClr val="FFB562"/>
-                </a:solidFill>
-                <a:latin typeface="Arial" panose="020B0604020202020204" pitchFamily="34" charset="0"/>
-                <a:cs typeface="Arial" panose="020B0604020202020204" pitchFamily="34" charset="0"/>
-              </a:rPr>
-              <a:t>megtervezése</a:t>
-            </a:r>
-            <a:endParaRPr lang="hu-HU" b="1" cap="small" dirty="0">
-              <a:solidFill>
-                <a:srgbClr val="FFB562"/>
-              </a:solidFill>
-              <a:latin typeface="Arial" panose="020B0604020202020204" pitchFamily="34" charset="0"/>
-              <a:cs typeface="Arial" panose="020B0604020202020204" pitchFamily="34" charset="0"/>
-            </a:endParaRPr>
+              <a:t>Sprintek megtervezése</a:t>
+            </a:r>
           </a:p>
         </p:txBody>
       </p:sp>
@@ -3640,21 +4123,6 @@
   <p:clrMapOvr>
     <a:masterClrMapping/>
   </p:clrMapOvr>
-  <mc:AlternateContent xmlns:mc="http://schemas.openxmlformats.org/markup-compatibility/2006" xmlns:p14="http://schemas.microsoft.com/office/powerpoint/2010/main">
-    <mc:Choice Requires="p14">
-      <p:transition p14:dur="0"/>
-    </mc:Choice>
-    <mc:Fallback xmlns="">
-      <p:transition/>
-    </mc:Fallback>
-  </mc:AlternateContent>
-  <p:timing>
-    <p:tnLst>
-      <p:par>
-        <p:cTn id="1" dur="indefinite" restart="never" nodeType="tmRoot"/>
-      </p:par>
-    </p:tnLst>
-  </p:timing>
 </p:sld>
 </file>
 
@@ -3697,7 +4165,7 @@
           <a:p>
             <a:pPr algn="ctr"/>
             <a:r>
-              <a:rPr lang="hu-HU" b="1" cap="small" dirty="0" smtClean="0">
+              <a:rPr lang="hu-HU" b="1" cap="small" dirty="0">
                 <a:solidFill>
                   <a:srgbClr val="FFB562"/>
                 </a:solidFill>
@@ -3706,13 +4174,6 @@
               </a:rPr>
               <a:t>Oldalak megtervezése</a:t>
             </a:r>
-            <a:endParaRPr lang="hu-HU" b="1" cap="small" dirty="0">
-              <a:solidFill>
-                <a:srgbClr val="FFB562"/>
-              </a:solidFill>
-              <a:latin typeface="Arial" panose="020B0604020202020204" pitchFamily="34" charset="0"/>
-              <a:cs typeface="Arial" panose="020B0604020202020204" pitchFamily="34" charset="0"/>
-            </a:endParaRPr>
           </a:p>
         </p:txBody>
       </p:sp>
@@ -3797,7 +4258,7 @@
         </p:blipFill>
         <p:spPr>
           <a:xfrm>
-            <a:off x="4237558" y="999517"/>
+            <a:off x="4443513" y="999517"/>
             <a:ext cx="3188859" cy="5639245"/>
           </a:xfrm>
           <a:prstGeom prst="rect">
@@ -3815,14 +4276,6 @@
   <p:clrMapOvr>
     <a:masterClrMapping/>
   </p:clrMapOvr>
-  <mc:AlternateContent xmlns:mc="http://schemas.openxmlformats.org/markup-compatibility/2006" xmlns:p14="http://schemas.microsoft.com/office/powerpoint/2010/main">
-    <mc:Choice Requires="p14">
-      <p:transition p14:dur="0"/>
-    </mc:Choice>
-    <mc:Fallback xmlns="">
-      <p:transition/>
-    </mc:Fallback>
-  </mc:AlternateContent>
   <p:timing>
     <p:tnLst>
       <p:par>
@@ -3915,33 +4368,15 @@
                                   </p:childTnLst>
                                 </p:cTn>
                               </p:par>
-                            </p:childTnLst>
-                          </p:cTn>
-                        </p:par>
-                      </p:childTnLst>
-                    </p:cTn>
-                  </p:par>
-                  <p:par>
-                    <p:cTn id="11" fill="hold">
-                      <p:stCondLst>
-                        <p:cond delay="indefinite"/>
-                      </p:stCondLst>
-                      <p:childTnLst>
-                        <p:par>
-                          <p:cTn id="12" fill="hold">
-                            <p:stCondLst>
-                              <p:cond delay="0"/>
-                            </p:stCondLst>
-                            <p:childTnLst>
                               <p:par>
-                                <p:cTn id="13" presetID="1" presetClass="entr" presetSubtype="0" fill="hold" nodeType="clickEffect">
+                                <p:cTn id="11" presetID="1" presetClass="entr" presetSubtype="0" fill="hold" nodeType="withEffect">
                                   <p:stCondLst>
                                     <p:cond delay="0"/>
                                   </p:stCondLst>
                                   <p:childTnLst>
                                     <p:set>
                                       <p:cBhvr>
-                                        <p:cTn id="14" dur="1" fill="hold">
+                                        <p:cTn id="12" dur="1" fill="hold">
                                           <p:stCondLst>
                                             <p:cond delay="0"/>
                                           </p:stCondLst>
@@ -3967,26 +4402,26 @@
                     </p:cTn>
                   </p:par>
                   <p:par>
-                    <p:cTn id="15" fill="hold">
+                    <p:cTn id="13" fill="hold">
                       <p:stCondLst>
                         <p:cond delay="indefinite"/>
                       </p:stCondLst>
                       <p:childTnLst>
                         <p:par>
-                          <p:cTn id="16" fill="hold">
+                          <p:cTn id="14" fill="hold">
                             <p:stCondLst>
                               <p:cond delay="0"/>
                             </p:stCondLst>
                             <p:childTnLst>
                               <p:par>
-                                <p:cTn id="17" presetID="1" presetClass="exit" presetSubtype="0" fill="hold" nodeType="clickEffect">
+                                <p:cTn id="15" presetID="1" presetClass="exit" presetSubtype="0" fill="hold" nodeType="clickEffect">
                                   <p:stCondLst>
                                     <p:cond delay="0"/>
                                   </p:stCondLst>
                                   <p:childTnLst>
                                     <p:set>
                                       <p:cBhvr>
-                                        <p:cTn id="18" dur="1" fill="hold">
+                                        <p:cTn id="16" dur="1" fill="hold">
                                           <p:stCondLst>
                                             <p:cond delay="0"/>
                                           </p:stCondLst>
@@ -4005,33 +4440,15 @@
                                   </p:childTnLst>
                                 </p:cTn>
                               </p:par>
-                            </p:childTnLst>
-                          </p:cTn>
-                        </p:par>
-                      </p:childTnLst>
-                    </p:cTn>
-                  </p:par>
-                  <p:par>
-                    <p:cTn id="19" fill="hold">
-                      <p:stCondLst>
-                        <p:cond delay="indefinite"/>
-                      </p:stCondLst>
-                      <p:childTnLst>
-                        <p:par>
-                          <p:cTn id="20" fill="hold">
-                            <p:stCondLst>
-                              <p:cond delay="0"/>
-                            </p:stCondLst>
-                            <p:childTnLst>
                               <p:par>
-                                <p:cTn id="21" presetID="1" presetClass="entr" presetSubtype="0" fill="hold" nodeType="clickEffect">
+                                <p:cTn id="17" presetID="1" presetClass="entr" presetSubtype="0" fill="hold" nodeType="withEffect">
                                   <p:stCondLst>
                                     <p:cond delay="0"/>
                                   </p:stCondLst>
                                   <p:childTnLst>
                                     <p:set>
                                       <p:cBhvr>
-                                        <p:cTn id="22" dur="1" fill="hold">
+                                        <p:cTn id="18" dur="1" fill="hold">
                                           <p:stCondLst>
                                             <p:cond delay="0"/>
                                           </p:stCondLst>
@@ -4120,7 +4537,7 @@
           <a:p>
             <a:pPr algn="ctr"/>
             <a:r>
-              <a:rPr lang="hu-HU" b="1" cap="small" dirty="0" smtClean="0">
+              <a:rPr lang="hu-HU" b="1" cap="small" dirty="0">
                 <a:solidFill>
                   <a:srgbClr val="FFB562"/>
                 </a:solidFill>
@@ -4129,13 +4546,6 @@
               </a:rPr>
               <a:t>Színek megtervezése</a:t>
             </a:r>
-            <a:endParaRPr lang="hu-HU" b="1" cap="small" dirty="0">
-              <a:solidFill>
-                <a:srgbClr val="FFB562"/>
-              </a:solidFill>
-              <a:latin typeface="Arial" panose="020B0604020202020204" pitchFamily="34" charset="0"/>
-              <a:cs typeface="Arial" panose="020B0604020202020204" pitchFamily="34" charset="0"/>
-            </a:endParaRPr>
           </a:p>
         </p:txBody>
       </p:sp>
@@ -4191,7 +4601,7 @@
           <a:lstStyle/>
           <a:p>
             <a:r>
-              <a:rPr lang="hu-HU" sz="3200" dirty="0" smtClean="0">
+              <a:rPr lang="hu-HU" sz="3200" dirty="0">
                 <a:solidFill>
                   <a:srgbClr val="F87474"/>
                 </a:solidFill>
@@ -4199,7 +4609,7 @@
               </a:rPr>
               <a:t>Colorhunt.co</a:t>
             </a:r>
-            <a:endParaRPr lang="hu-HU" sz="3200" dirty="0" smtClean="0">
+            <a:endParaRPr lang="hu-HU" sz="3200" dirty="0">
               <a:solidFill>
                 <a:srgbClr val="F87474"/>
               </a:solidFill>
@@ -4217,21 +4627,6 @@
   <p:clrMapOvr>
     <a:masterClrMapping/>
   </p:clrMapOvr>
-  <mc:AlternateContent xmlns:mc="http://schemas.openxmlformats.org/markup-compatibility/2006" xmlns:p14="http://schemas.microsoft.com/office/powerpoint/2010/main">
-    <mc:Choice Requires="p14">
-      <p:transition p14:dur="0"/>
-    </mc:Choice>
-    <mc:Fallback xmlns="">
-      <p:transition/>
-    </mc:Fallback>
-  </mc:AlternateContent>
-  <p:timing>
-    <p:tnLst>
-      <p:par>
-        <p:cTn id="1" dur="indefinite" restart="never" nodeType="tmRoot"/>
-      </p:par>
-    </p:tnLst>
-  </p:timing>
 </p:sld>
 </file>
 
@@ -4274,7 +4669,7 @@
           <a:p>
             <a:pPr algn="ctr"/>
             <a:r>
-              <a:rPr lang="hu-HU" b="1" cap="small" dirty="0" smtClean="0">
+              <a:rPr lang="hu-HU" b="1" cap="small" dirty="0">
                 <a:solidFill>
                   <a:srgbClr val="FFB562"/>
                 </a:solidFill>
@@ -4284,7 +4679,7 @@
               <a:t>Tervezés </a:t>
             </a:r>
             <a:r>
-              <a:rPr lang="hu-HU" b="1" cap="small" dirty="0" err="1" smtClean="0">
+              <a:rPr lang="hu-HU" b="1" cap="small" dirty="0" err="1">
                 <a:solidFill>
                   <a:srgbClr val="FFB562"/>
                 </a:solidFill>
@@ -4342,21 +4737,6 @@
   <p:clrMapOvr>
     <a:masterClrMapping/>
   </p:clrMapOvr>
-  <mc:AlternateContent xmlns:mc="http://schemas.openxmlformats.org/markup-compatibility/2006" xmlns:p14="http://schemas.microsoft.com/office/powerpoint/2010/main">
-    <mc:Choice Requires="p14">
-      <p:transition p14:dur="0"/>
-    </mc:Choice>
-    <mc:Fallback xmlns="">
-      <p:transition/>
-    </mc:Fallback>
-  </mc:AlternateContent>
-  <p:timing>
-    <p:tnLst>
-      <p:par>
-        <p:cTn id="1" dur="indefinite" restart="never" nodeType="tmRoot"/>
-      </p:par>
-    </p:tnLst>
-  </p:timing>
 </p:sld>
 </file>
 
@@ -4394,7 +4774,7 @@
           <a:p>
             <a:pPr algn="ctr"/>
             <a:r>
-              <a:rPr lang="hu-HU" b="1" cap="small" dirty="0" smtClean="0">
+              <a:rPr lang="hu-HU" b="1" cap="small" dirty="0">
                 <a:solidFill>
                   <a:srgbClr val="FFB562"/>
                 </a:solidFill>
@@ -4404,7 +4784,7 @@
               <a:t>A </a:t>
             </a:r>
             <a:r>
-              <a:rPr lang="hu-HU" b="1" cap="small" dirty="0" err="1" smtClean="0">
+              <a:rPr lang="hu-HU" b="1" cap="small" dirty="0" err="1">
                 <a:solidFill>
                   <a:srgbClr val="FFB562"/>
                 </a:solidFill>
@@ -4414,7 +4794,7 @@
               <a:t>scrum</a:t>
             </a:r>
             <a:r>
-              <a:rPr lang="hu-HU" b="1" cap="small" dirty="0" smtClean="0">
+              <a:rPr lang="hu-HU" b="1" cap="small" dirty="0">
                 <a:solidFill>
                   <a:srgbClr val="FFB562"/>
                 </a:solidFill>
@@ -4423,13 +4803,6 @@
               </a:rPr>
               <a:t> rugalmassága</a:t>
             </a:r>
-            <a:endParaRPr lang="hu-HU" b="1" cap="small" dirty="0">
-              <a:solidFill>
-                <a:srgbClr val="FFB562"/>
-              </a:solidFill>
-              <a:latin typeface="Arial" panose="020B0604020202020204" pitchFamily="34" charset="0"/>
-              <a:cs typeface="Arial" panose="020B0604020202020204" pitchFamily="34" charset="0"/>
-            </a:endParaRPr>
           </a:p>
         </p:txBody>
       </p:sp>
@@ -4455,14 +4828,13 @@
           <a:p>
             <a:pPr algn="ctr"/>
             <a:r>
-              <a:rPr lang="hu-HU" dirty="0" err="1" smtClean="0"/>
+              <a:rPr lang="hu-HU" dirty="0" err="1"/>
               <a:t>Paintes</a:t>
             </a:r>
             <a:r>
-              <a:rPr lang="hu-HU" dirty="0" smtClean="0"/>
+              <a:rPr lang="hu-HU" dirty="0"/>
               <a:t> tervek</a:t>
             </a:r>
-            <a:endParaRPr lang="hu-HU" dirty="0"/>
           </a:p>
         </p:txBody>
       </p:sp>
@@ -4516,14 +4888,13 @@
           <a:p>
             <a:pPr algn="ctr"/>
             <a:r>
-              <a:rPr lang="hu-HU" dirty="0" err="1" smtClean="0"/>
+              <a:rPr lang="hu-HU" dirty="0" err="1"/>
               <a:t>Figmás</a:t>
             </a:r>
             <a:r>
-              <a:rPr lang="hu-HU" dirty="0" smtClean="0"/>
+              <a:rPr lang="hu-HU" dirty="0"/>
               <a:t> tervek</a:t>
             </a:r>
-            <a:endParaRPr lang="hu-HU" dirty="0"/>
           </a:p>
         </p:txBody>
       </p:sp>
@@ -4551,7 +4922,7 @@
         </p:blipFill>
         <p:spPr>
           <a:xfrm>
-            <a:off x="7027898" y="2135982"/>
+            <a:off x="7038218" y="2135983"/>
             <a:ext cx="3830602" cy="4566530"/>
           </a:xfrm>
         </p:spPr>
@@ -4577,7 +4948,7 @@
         </p:blipFill>
         <p:spPr>
           <a:xfrm>
-            <a:off x="1319862" y="2135982"/>
+            <a:off x="1346284" y="2136882"/>
             <a:ext cx="3566319" cy="4677292"/>
           </a:xfrm>
           <a:prstGeom prst="rect">
@@ -4607,7 +4978,7 @@
         </p:blipFill>
         <p:spPr>
           <a:xfrm>
-            <a:off x="7056986" y="2211705"/>
+            <a:off x="7067306" y="2152380"/>
             <a:ext cx="3801514" cy="4646295"/>
           </a:xfrm>
           <a:prstGeom prst="rect">
@@ -4636,7 +5007,7 @@
         </p:blipFill>
         <p:spPr>
           <a:xfrm>
-            <a:off x="377764" y="3748710"/>
+            <a:off x="36953" y="2314672"/>
             <a:ext cx="6184979" cy="4040188"/>
           </a:xfrm>
           <a:prstGeom prst="rect">
@@ -4666,7 +5037,7 @@
         </p:blipFill>
         <p:spPr>
           <a:xfrm>
-            <a:off x="6784929" y="3748710"/>
+            <a:off x="6600104" y="2314672"/>
             <a:ext cx="4570459" cy="3799538"/>
           </a:xfrm>
           <a:prstGeom prst="rect">
@@ -4695,7 +5066,7 @@
         </p:blipFill>
         <p:spPr>
           <a:xfrm>
-            <a:off x="721771" y="6533550"/>
+            <a:off x="644572" y="2160834"/>
             <a:ext cx="4762500" cy="4721355"/>
           </a:xfrm>
           <a:prstGeom prst="rect">
@@ -4725,8 +5096,8 @@
         </p:blipFill>
         <p:spPr>
           <a:xfrm>
-            <a:off x="7907253" y="4717455"/>
-            <a:ext cx="2733190" cy="4860702"/>
+            <a:off x="7586924" y="2135982"/>
+            <a:ext cx="2733190" cy="4566530"/>
           </a:xfrm>
           <a:prstGeom prst="rect">
             <a:avLst/>
@@ -4777,7 +5148,7 @@
                                           </p:stCondLst>
                                         </p:cTn>
                                         <p:tgtEl>
-                                          <p:spTgt spid="10"/>
+                                          <p:spTgt spid="7"/>
                                         </p:tgtEl>
                                         <p:attrNameLst>
                                           <p:attrName>style.visibility</p:attrName>
@@ -4804,6 +5175,123 @@
                                           </p:stCondLst>
                                         </p:cTn>
                                         <p:tgtEl>
+                                          <p:spTgt spid="8"/>
+                                        </p:tgtEl>
+                                        <p:attrNameLst>
+                                          <p:attrName>style.visibility</p:attrName>
+                                        </p:attrNameLst>
+                                      </p:cBhvr>
+                                      <p:to>
+                                        <p:strVal val="visible"/>
+                                      </p:to>
+                                    </p:set>
+                                  </p:childTnLst>
+                                </p:cTn>
+                              </p:par>
+                            </p:childTnLst>
+                          </p:cTn>
+                        </p:par>
+                      </p:childTnLst>
+                    </p:cTn>
+                  </p:par>
+                  <p:par>
+                    <p:cTn id="9" fill="hold">
+                      <p:stCondLst>
+                        <p:cond delay="indefinite"/>
+                      </p:stCondLst>
+                      <p:childTnLst>
+                        <p:par>
+                          <p:cTn id="10" fill="hold">
+                            <p:stCondLst>
+                              <p:cond delay="0"/>
+                            </p:stCondLst>
+                            <p:childTnLst>
+                              <p:par>
+                                <p:cTn id="11" presetID="1" presetClass="exit" presetSubtype="0" fill="hold" nodeType="clickEffect">
+                                  <p:stCondLst>
+                                    <p:cond delay="0"/>
+                                  </p:stCondLst>
+                                  <p:childTnLst>
+                                    <p:set>
+                                      <p:cBhvr>
+                                        <p:cTn id="12" dur="1" fill="hold">
+                                          <p:stCondLst>
+                                            <p:cond delay="0"/>
+                                          </p:stCondLst>
+                                        </p:cTn>
+                                        <p:tgtEl>
+                                          <p:spTgt spid="8"/>
+                                        </p:tgtEl>
+                                        <p:attrNameLst>
+                                          <p:attrName>style.visibility</p:attrName>
+                                        </p:attrNameLst>
+                                      </p:cBhvr>
+                                      <p:to>
+                                        <p:strVal val="hidden"/>
+                                      </p:to>
+                                    </p:set>
+                                  </p:childTnLst>
+                                </p:cTn>
+                              </p:par>
+                              <p:par>
+                                <p:cTn id="13" presetID="1" presetClass="exit" presetSubtype="0" fill="hold" nodeType="withEffect">
+                                  <p:stCondLst>
+                                    <p:cond delay="0"/>
+                                  </p:stCondLst>
+                                  <p:childTnLst>
+                                    <p:set>
+                                      <p:cBhvr>
+                                        <p:cTn id="14" dur="1" fill="hold">
+                                          <p:stCondLst>
+                                            <p:cond delay="0"/>
+                                          </p:stCondLst>
+                                        </p:cTn>
+                                        <p:tgtEl>
+                                          <p:spTgt spid="7"/>
+                                        </p:tgtEl>
+                                        <p:attrNameLst>
+                                          <p:attrName>style.visibility</p:attrName>
+                                        </p:attrNameLst>
+                                      </p:cBhvr>
+                                      <p:to>
+                                        <p:strVal val="hidden"/>
+                                      </p:to>
+                                    </p:set>
+                                  </p:childTnLst>
+                                </p:cTn>
+                              </p:par>
+                            </p:childTnLst>
+                          </p:cTn>
+                        </p:par>
+                      </p:childTnLst>
+                    </p:cTn>
+                  </p:par>
+                  <p:par>
+                    <p:cTn id="15" fill="hold">
+                      <p:stCondLst>
+                        <p:cond delay="indefinite"/>
+                      </p:stCondLst>
+                      <p:childTnLst>
+                        <p:par>
+                          <p:cTn id="16" fill="hold">
+                            <p:stCondLst>
+                              <p:cond delay="0"/>
+                            </p:stCondLst>
+                            <p:childTnLst>
+                              <p:par>
+                                <p:cTn id="17" presetID="1" presetClass="entr" presetSubtype="0" fill="hold" nodeType="clickEffect">
+                                  <p:stCondLst>
+                                    <p:cond delay="0"/>
+                                  </p:stCondLst>
+                                  <p:childTnLst>
+                                    <p:set>
+                                      <p:cBhvr>
+                                        <p:cTn id="18" dur="1" fill="hold">
+                                          <p:stCondLst>
+                                            <p:cond delay="0"/>
+                                          </p:stCondLst>
+                                        </p:cTn>
+                                        <p:tgtEl>
                                           <p:spTgt spid="9"/>
                                         </p:tgtEl>
                                         <p:attrNameLst>
@@ -4818,14 +5306,59 @@
                                 </p:cTn>
                               </p:par>
                               <p:par>
-                                <p:cTn id="9" presetID="1" presetClass="exit" presetSubtype="0" fill="hold" nodeType="withEffect">
+                                <p:cTn id="19" presetID="1" presetClass="entr" presetSubtype="0" fill="hold" nodeType="withEffect">
                                   <p:stCondLst>
                                     <p:cond delay="0"/>
                                   </p:stCondLst>
                                   <p:childTnLst>
                                     <p:set>
                                       <p:cBhvr>
-                                        <p:cTn id="10" dur="1" fill="hold">
+                                        <p:cTn id="20" dur="1" fill="hold">
+                                          <p:stCondLst>
+                                            <p:cond delay="0"/>
+                                          </p:stCondLst>
+                                        </p:cTn>
+                                        <p:tgtEl>
+                                          <p:spTgt spid="10"/>
+                                        </p:tgtEl>
+                                        <p:attrNameLst>
+                                          <p:attrName>style.visibility</p:attrName>
+                                        </p:attrNameLst>
+                                      </p:cBhvr>
+                                      <p:to>
+                                        <p:strVal val="visible"/>
+                                      </p:to>
+                                    </p:set>
+                                  </p:childTnLst>
+                                </p:cTn>
+                              </p:par>
+                            </p:childTnLst>
+                          </p:cTn>
+                        </p:par>
+                      </p:childTnLst>
+                    </p:cTn>
+                  </p:par>
+                  <p:par>
+                    <p:cTn id="21" fill="hold">
+                      <p:stCondLst>
+                        <p:cond delay="indefinite"/>
+                      </p:stCondLst>
+                      <p:childTnLst>
+                        <p:par>
+                          <p:cTn id="22" fill="hold">
+                            <p:stCondLst>
+                              <p:cond delay="0"/>
+                            </p:stCondLst>
+                            <p:childTnLst>
+                              <p:par>
+                                <p:cTn id="23" presetID="1" presetClass="exit" presetSubtype="0" fill="hold" nodeType="clickEffect">
+                                  <p:stCondLst>
+                                    <p:cond delay="0"/>
+                                  </p:stCondLst>
+                                  <p:childTnLst>
+                                    <p:set>
+                                      <p:cBhvr>
+                                        <p:cTn id="24" dur="1" fill="hold">
                                           <p:stCondLst>
                                             <p:cond delay="0"/>
                                           </p:stCondLst>
@@ -4845,14 +5378,14 @@
                                 </p:cTn>
                               </p:par>
                               <p:par>
-                                <p:cTn id="11" presetID="1" presetClass="exit" presetSubtype="0" fill="hold" nodeType="withEffect">
+                                <p:cTn id="25" presetID="1" presetClass="exit" presetSubtype="0" fill="hold" nodeType="withEffect">
                                   <p:stCondLst>
                                     <p:cond delay="0"/>
                                   </p:stCondLst>
                                   <p:childTnLst>
                                     <p:set>
                                       <p:cBhvr>
-                                        <p:cTn id="12" dur="1" fill="hold">
+                                        <p:cTn id="26" dur="1" fill="hold">
                                           <p:stCondLst>
                                             <p:cond delay="0"/>
                                           </p:stCondLst>
@@ -4871,15 +5404,33 @@
                                   </p:childTnLst>
                                 </p:cTn>
                               </p:par>
+                            </p:childTnLst>
+                          </p:cTn>
+                        </p:par>
+                      </p:childTnLst>
+                    </p:cTn>
+                  </p:par>
+                  <p:par>
+                    <p:cTn id="27" fill="hold">
+                      <p:stCondLst>
+                        <p:cond delay="indefinite"/>
+                      </p:stCondLst>
+                      <p:childTnLst>
+                        <p:par>
+                          <p:cTn id="28" fill="hold">
+                            <p:stCondLst>
+                              <p:cond delay="0"/>
+                            </p:stCondLst>
+                            <p:childTnLst>
                               <p:par>
-                                <p:cTn id="13" presetID="1" presetClass="entr" presetSubtype="0" fill="hold" nodeType="withEffect">
+                                <p:cTn id="29" presetID="1" presetClass="entr" presetSubtype="0" fill="hold" nodeType="clickEffect">
                                   <p:stCondLst>
                                     <p:cond delay="0"/>
                                   </p:stCondLst>
                                   <p:childTnLst>
                                     <p:set>
                                       <p:cBhvr>
-                                        <p:cTn id="14" dur="1" fill="hold">
+                                        <p:cTn id="30" dur="1" fill="hold">
                                           <p:stCondLst>
                                             <p:cond delay="0"/>
                                           </p:stCondLst>
@@ -4899,14 +5450,14 @@
                                 </p:cTn>
                               </p:par>
                               <p:par>
-                                <p:cTn id="15" presetID="1" presetClass="entr" presetSubtype="0" fill="hold" nodeType="withEffect">
+                                <p:cTn id="31" presetID="1" presetClass="entr" presetSubtype="0" fill="hold" nodeType="withEffect">
                                   <p:stCondLst>
                                     <p:cond delay="0"/>
                                   </p:stCondLst>
                                   <p:childTnLst>
                                     <p:set>
                                       <p:cBhvr>
-                                        <p:cTn id="16" dur="1" fill="hold">
+                                        <p:cTn id="32" dur="1" fill="hold">
                                           <p:stCondLst>
                                             <p:cond delay="0"/>
                                           </p:stCondLst>
@@ -4925,15 +5476,33 @@
                                   </p:childTnLst>
                                 </p:cTn>
                               </p:par>
+                            </p:childTnLst>
+                          </p:cTn>
+                        </p:par>
+                      </p:childTnLst>
+                    </p:cTn>
+                  </p:par>
+                  <p:par>
+                    <p:cTn id="33" fill="hold">
+                      <p:stCondLst>
+                        <p:cond delay="indefinite"/>
+                      </p:stCondLst>
+                      <p:childTnLst>
+                        <p:par>
+                          <p:cTn id="34" fill="hold">
+                            <p:stCondLst>
+                              <p:cond delay="0"/>
+                            </p:stCondLst>
+                            <p:childTnLst>
                               <p:par>
-                                <p:cTn id="17" presetID="1" presetClass="exit" presetSubtype="0" fill="hold" nodeType="withEffect">
+                                <p:cTn id="35" presetID="1" presetClass="exit" presetSubtype="0" fill="hold" nodeType="clickEffect">
                                   <p:stCondLst>
                                     <p:cond delay="0"/>
                                   </p:stCondLst>
                                   <p:childTnLst>
                                     <p:set>
                                       <p:cBhvr>
-                                        <p:cTn id="18" dur="1" fill="hold">
+                                        <p:cTn id="36" dur="1" fill="hold">
                                           <p:stCondLst>
                                             <p:cond delay="0"/>
                                           </p:stCondLst>
@@ -4953,14 +5522,14 @@
                                 </p:cTn>
                               </p:par>
                               <p:par>
-                                <p:cTn id="19" presetID="1" presetClass="exit" presetSubtype="0" fill="hold" nodeType="withEffect">
+                                <p:cTn id="37" presetID="1" presetClass="exit" presetSubtype="0" fill="hold" nodeType="withEffect">
                                   <p:stCondLst>
                                     <p:cond delay="0"/>
                                   </p:stCondLst>
                                   <p:childTnLst>
                                     <p:set>
                                       <p:cBhvr>
-                                        <p:cTn id="20" dur="1" fill="hold">
+                                        <p:cTn id="38" dur="1" fill="hold">
                                           <p:stCondLst>
                                             <p:cond delay="0"/>
                                           </p:stCondLst>
@@ -4979,15 +5548,33 @@
                                   </p:childTnLst>
                                 </p:cTn>
                               </p:par>
+                            </p:childTnLst>
+                          </p:cTn>
+                        </p:par>
+                      </p:childTnLst>
+                    </p:cTn>
+                  </p:par>
+                  <p:par>
+                    <p:cTn id="39" fill="hold">
+                      <p:stCondLst>
+                        <p:cond delay="indefinite"/>
+                      </p:stCondLst>
+                      <p:childTnLst>
+                        <p:par>
+                          <p:cTn id="40" fill="hold">
+                            <p:stCondLst>
+                              <p:cond delay="0"/>
+                            </p:stCondLst>
+                            <p:childTnLst>
                               <p:par>
-                                <p:cTn id="21" presetID="1" presetClass="entr" presetSubtype="0" fill="hold" nodeType="withEffect">
+                                <p:cTn id="41" presetID="1" presetClass="entr" presetSubtype="0" fill="hold" nodeType="clickEffect">
                                   <p:stCondLst>
                                     <p:cond delay="0"/>
                                   </p:stCondLst>
                                   <p:childTnLst>
                                     <p:set>
                                       <p:cBhvr>
-                                        <p:cTn id="22" dur="1" fill="hold">
+                                        <p:cTn id="42" dur="1" fill="hold">
                                           <p:stCondLst>
                                             <p:cond delay="0"/>
                                           </p:stCondLst>
@@ -5007,14 +5594,14 @@
                                 </p:cTn>
                               </p:par>
                               <p:par>
-                                <p:cTn id="23" presetID="1" presetClass="entr" presetSubtype="0" fill="hold" nodeType="withEffect">
+                                <p:cTn id="43" presetID="1" presetClass="entr" presetSubtype="0" fill="hold" nodeType="withEffect">
                                   <p:stCondLst>
                                     <p:cond delay="0"/>
                                   </p:stCondLst>
                                   <p:childTnLst>
                                     <p:set>
                                       <p:cBhvr>
-                                        <p:cTn id="24" dur="1" fill="hold">
+                                        <p:cTn id="44" dur="1" fill="hold">
                                           <p:stCondLst>
                                             <p:cond delay="0"/>
                                           </p:stCondLst>
@@ -5105,7 +5692,7 @@
           <a:p>
             <a:pPr algn="ctr"/>
             <a:r>
-              <a:rPr lang="hu-HU" sz="8000" b="1" cap="small" dirty="0" smtClean="0">
+              <a:rPr lang="hu-HU" sz="8000" b="1" cap="small" dirty="0">
                 <a:solidFill>
                   <a:srgbClr val="FFB562"/>
                 </a:solidFill>
@@ -5114,13 +5701,6 @@
               </a:rPr>
               <a:t>A projekt felépítése</a:t>
             </a:r>
-            <a:endParaRPr lang="hu-HU" sz="8000" b="1" cap="small" dirty="0">
-              <a:solidFill>
-                <a:srgbClr val="FFB562"/>
-              </a:solidFill>
-              <a:latin typeface="Arial" panose="020B0604020202020204" pitchFamily="34" charset="0"/>
-              <a:cs typeface="Arial" panose="020B0604020202020204" pitchFamily="34" charset="0"/>
-            </a:endParaRPr>
           </a:p>
         </p:txBody>
       </p:sp>
@@ -5134,13 +5714,6 @@
   <p:clrMapOvr>
     <a:masterClrMapping/>
   </p:clrMapOvr>
-  <p:timing>
-    <p:tnLst>
-      <p:par>
-        <p:cTn id="1" dur="indefinite" restart="never" nodeType="tmRoot"/>
-      </p:par>
-    </p:tnLst>
-  </p:timing>
 </p:sld>
 </file>
 
@@ -5185,7 +5758,7 @@
           <a:p>
             <a:pPr algn="ctr"/>
             <a:r>
-              <a:rPr lang="hu-HU" b="1" cap="small" dirty="0" smtClean="0">
+              <a:rPr lang="hu-HU" b="1" cap="small" dirty="0">
                 <a:solidFill>
                   <a:srgbClr val="FFB562"/>
                 </a:solidFill>
@@ -5194,13 +5767,6 @@
               </a:rPr>
               <a:t>Főoldal</a:t>
             </a:r>
-            <a:endParaRPr lang="hu-HU" b="1" cap="small" dirty="0">
-              <a:solidFill>
-                <a:srgbClr val="FFB562"/>
-              </a:solidFill>
-              <a:latin typeface="Arial" panose="020B0604020202020204" pitchFamily="34" charset="0"/>
-              <a:cs typeface="Arial" panose="020B0604020202020204" pitchFamily="34" charset="0"/>
-            </a:endParaRPr>
           </a:p>
         </p:txBody>
       </p:sp>
@@ -5233,21 +5799,6 @@
   <p:clrMapOvr>
     <a:masterClrMapping/>
   </p:clrMapOvr>
-  <mc:AlternateContent xmlns:mc="http://schemas.openxmlformats.org/markup-compatibility/2006" xmlns:p14="http://schemas.microsoft.com/office/powerpoint/2010/main">
-    <mc:Choice Requires="p14">
-      <p:transition p14:dur="0"/>
-    </mc:Choice>
-    <mc:Fallback xmlns="">
-      <p:transition/>
-    </mc:Fallback>
-  </mc:AlternateContent>
-  <p:timing>
-    <p:tnLst>
-      <p:par>
-        <p:cTn id="1" dur="indefinite" restart="never" nodeType="tmRoot"/>
-      </p:par>
-    </p:tnLst>
-  </p:timing>
 </p:sld>
 </file>
 

</xml_diff>

<commit_message>
Kulimák képek készítése, powerpoint véglegesítése
</commit_message>
<xml_diff>
--- a/ikt projektfeladat.pptx
+++ b/ikt projektfeladat.pptx
@@ -260,7 +260,7 @@
           <a:p>
             <a:fld id="{38C4BF85-5AB0-4169-A990-10DF94846CFA}" type="datetimeFigureOut">
               <a:rPr lang="hu-HU" smtClean="0"/>
-              <a:t>2023. 02. 06.</a:t>
+              <a:t>2023. 02. 07.</a:t>
             </a:fld>
             <a:endParaRPr lang="hu-HU"/>
           </a:p>
@@ -430,7 +430,7 @@
           <a:p>
             <a:fld id="{38C4BF85-5AB0-4169-A990-10DF94846CFA}" type="datetimeFigureOut">
               <a:rPr lang="hu-HU" smtClean="0"/>
-              <a:t>2023. 02. 06.</a:t>
+              <a:t>2023. 02. 07.</a:t>
             </a:fld>
             <a:endParaRPr lang="hu-HU"/>
           </a:p>
@@ -610,7 +610,7 @@
           <a:p>
             <a:fld id="{38C4BF85-5AB0-4169-A990-10DF94846CFA}" type="datetimeFigureOut">
               <a:rPr lang="hu-HU" smtClean="0"/>
-              <a:t>2023. 02. 06.</a:t>
+              <a:t>2023. 02. 07.</a:t>
             </a:fld>
             <a:endParaRPr lang="hu-HU"/>
           </a:p>
@@ -780,7 +780,7 @@
           <a:p>
             <a:fld id="{38C4BF85-5AB0-4169-A990-10DF94846CFA}" type="datetimeFigureOut">
               <a:rPr lang="hu-HU" smtClean="0"/>
-              <a:t>2023. 02. 06.</a:t>
+              <a:t>2023. 02. 07.</a:t>
             </a:fld>
             <a:endParaRPr lang="hu-HU"/>
           </a:p>
@@ -1026,7 +1026,7 @@
           <a:p>
             <a:fld id="{38C4BF85-5AB0-4169-A990-10DF94846CFA}" type="datetimeFigureOut">
               <a:rPr lang="hu-HU" smtClean="0"/>
-              <a:t>2023. 02. 06.</a:t>
+              <a:t>2023. 02. 07.</a:t>
             </a:fld>
             <a:endParaRPr lang="hu-HU"/>
           </a:p>
@@ -1258,7 +1258,7 @@
           <a:p>
             <a:fld id="{38C4BF85-5AB0-4169-A990-10DF94846CFA}" type="datetimeFigureOut">
               <a:rPr lang="hu-HU" smtClean="0"/>
-              <a:t>2023. 02. 06.</a:t>
+              <a:t>2023. 02. 07.</a:t>
             </a:fld>
             <a:endParaRPr lang="hu-HU"/>
           </a:p>
@@ -1625,7 +1625,7 @@
           <a:p>
             <a:fld id="{38C4BF85-5AB0-4169-A990-10DF94846CFA}" type="datetimeFigureOut">
               <a:rPr lang="hu-HU" smtClean="0"/>
-              <a:t>2023. 02. 06.</a:t>
+              <a:t>2023. 02. 07.</a:t>
             </a:fld>
             <a:endParaRPr lang="hu-HU"/>
           </a:p>
@@ -1743,7 +1743,7 @@
           <a:p>
             <a:fld id="{38C4BF85-5AB0-4169-A990-10DF94846CFA}" type="datetimeFigureOut">
               <a:rPr lang="hu-HU" smtClean="0"/>
-              <a:t>2023. 02. 06.</a:t>
+              <a:t>2023. 02. 07.</a:t>
             </a:fld>
             <a:endParaRPr lang="hu-HU"/>
           </a:p>
@@ -1838,7 +1838,7 @@
           <a:p>
             <a:fld id="{38C4BF85-5AB0-4169-A990-10DF94846CFA}" type="datetimeFigureOut">
               <a:rPr lang="hu-HU" smtClean="0"/>
-              <a:t>2023. 02. 06.</a:t>
+              <a:t>2023. 02. 07.</a:t>
             </a:fld>
             <a:endParaRPr lang="hu-HU"/>
           </a:p>
@@ -2115,7 +2115,7 @@
           <a:p>
             <a:fld id="{38C4BF85-5AB0-4169-A990-10DF94846CFA}" type="datetimeFigureOut">
               <a:rPr lang="hu-HU" smtClean="0"/>
-              <a:t>2023. 02. 06.</a:t>
+              <a:t>2023. 02. 07.</a:t>
             </a:fld>
             <a:endParaRPr lang="hu-HU"/>
           </a:p>
@@ -2372,7 +2372,7 @@
           <a:p>
             <a:fld id="{38C4BF85-5AB0-4169-A990-10DF94846CFA}" type="datetimeFigureOut">
               <a:rPr lang="hu-HU" smtClean="0"/>
-              <a:t>2023. 02. 06.</a:t>
+              <a:t>2023. 02. 07.</a:t>
             </a:fld>
             <a:endParaRPr lang="hu-HU"/>
           </a:p>
@@ -2585,7 +2585,7 @@
           <a:p>
             <a:fld id="{38C4BF85-5AB0-4169-A990-10DF94846CFA}" type="datetimeFigureOut">
               <a:rPr lang="hu-HU" smtClean="0"/>
-              <a:t>2023. 02. 06.</a:t>
+              <a:t>2023. 02. 07.</a:t>
             </a:fld>
             <a:endParaRPr lang="hu-HU"/>
           </a:p>
@@ -3058,7 +3058,9 @@
           </a:xfrm>
         </p:spPr>
         <p:txBody>
-          <a:bodyPr/>
+          <a:bodyPr>
+            <a:normAutofit fontScale="92500"/>
+          </a:bodyPr>
           <a:lstStyle/>
           <a:p>
             <a:r>
@@ -3066,7 +3068,8 @@
                 <a:solidFill>
                   <a:srgbClr val="F87474"/>
                 </a:solidFill>
-                <a:latin typeface="Arial" panose="020B0604020202020204" pitchFamily="34" charset="0"/>
+                <a:latin typeface="Inter" panose="02000503000000020004" pitchFamily="2" charset="0"/>
+                <a:ea typeface="Inter" panose="02000503000000020004" pitchFamily="2" charset="0"/>
                 <a:cs typeface="Arial" panose="020B0604020202020204" pitchFamily="34" charset="0"/>
               </a:rPr>
               <a:t>Készítők: Beréti Zsófia, Császár András, Kulimák Máté</a:t>
@@ -3132,7 +3135,8 @@
                 <a:solidFill>
                   <a:srgbClr val="FFB562"/>
                 </a:solidFill>
-                <a:latin typeface="Arial" panose="020B0604020202020204" pitchFamily="34" charset="0"/>
+                <a:latin typeface="Inter" panose="02000503000000020004" pitchFamily="2" charset="0"/>
+                <a:ea typeface="Inter" panose="02000503000000020004" pitchFamily="2" charset="0"/>
                 <a:cs typeface="Arial" panose="020B0604020202020204" pitchFamily="34" charset="0"/>
               </a:rPr>
               <a:t>Kulimákok</a:t>
@@ -3217,7 +3221,8 @@
                 <a:solidFill>
                   <a:srgbClr val="FFB562"/>
                 </a:solidFill>
-                <a:latin typeface="Arial" panose="020B0604020202020204" pitchFamily="34" charset="0"/>
+                <a:latin typeface="Inter" panose="02000503000000020004" pitchFamily="2" charset="0"/>
+                <a:ea typeface="Inter" panose="02000503000000020004" pitchFamily="2" charset="0"/>
                 <a:cs typeface="Arial" panose="020B0604020202020204" pitchFamily="34" charset="0"/>
               </a:rPr>
               <a:t>Gomb</a:t>
@@ -3302,7 +3307,8 @@
                 <a:solidFill>
                   <a:srgbClr val="FFB562"/>
                 </a:solidFill>
-                <a:latin typeface="Arial" panose="020B0604020202020204" pitchFamily="34" charset="0"/>
+                <a:latin typeface="Inter" panose="02000503000000020004" pitchFamily="2" charset="0"/>
+                <a:ea typeface="Inter" panose="02000503000000020004" pitchFamily="2" charset="0"/>
                 <a:cs typeface="Arial" panose="020B0604020202020204" pitchFamily="34" charset="0"/>
               </a:rPr>
               <a:t>Rólunk</a:t>
@@ -3387,7 +3393,8 @@
                 <a:solidFill>
                   <a:srgbClr val="FFB562"/>
                 </a:solidFill>
-                <a:latin typeface="Arial" panose="020B0604020202020204" pitchFamily="34" charset="0"/>
+                <a:latin typeface="Inter" panose="02000503000000020004" pitchFamily="2" charset="0"/>
+                <a:ea typeface="Inter" panose="02000503000000020004" pitchFamily="2" charset="0"/>
                 <a:cs typeface="Arial" panose="020B0604020202020204" pitchFamily="34" charset="0"/>
               </a:rPr>
               <a:t>És hogy ki mit csinált?</a:t>
@@ -3453,7 +3460,8 @@
                 <a:solidFill>
                   <a:srgbClr val="FFB562"/>
                 </a:solidFill>
-                <a:latin typeface="Arial" panose="020B0604020202020204" pitchFamily="34" charset="0"/>
+                <a:latin typeface="Inter" panose="02000503000000020004" pitchFamily="2" charset="0"/>
+                <a:ea typeface="Inter" panose="02000503000000020004" pitchFamily="2" charset="0"/>
                 <a:cs typeface="Arial" panose="020B0604020202020204" pitchFamily="34" charset="0"/>
               </a:rPr>
               <a:t>Beréti Zsófia része a projektben</a:t>
@@ -3538,7 +3546,8 @@
                 <a:solidFill>
                   <a:srgbClr val="FFB562"/>
                 </a:solidFill>
-                <a:latin typeface="Arial" panose="020B0604020202020204" pitchFamily="34" charset="0"/>
+                <a:latin typeface="Inter" panose="02000503000000020004" pitchFamily="2" charset="0"/>
+                <a:ea typeface="Inter" panose="02000503000000020004" pitchFamily="2" charset="0"/>
                 <a:cs typeface="Arial" panose="020B0604020202020204" pitchFamily="34" charset="0"/>
               </a:rPr>
               <a:t>Császár Andris része a projektben</a:t>
@@ -3623,7 +3632,8 @@
                 <a:solidFill>
                   <a:srgbClr val="FFB562"/>
                 </a:solidFill>
-                <a:latin typeface="Arial" panose="020B0604020202020204" pitchFamily="34" charset="0"/>
+                <a:latin typeface="Inter" panose="02000503000000020004" pitchFamily="2" charset="0"/>
+                <a:ea typeface="Inter" panose="02000503000000020004" pitchFamily="2" charset="0"/>
                 <a:cs typeface="Arial" panose="020B0604020202020204" pitchFamily="34" charset="0"/>
               </a:rPr>
               <a:t>Kulimák Máté része a projektben</a:t>
@@ -3643,104 +3653,139 @@
         </p:nvSpPr>
         <p:spPr>
           <a:xfrm>
-            <a:off x="809171" y="1971041"/>
-            <a:ext cx="3081694" cy="3897913"/>
+            <a:off x="809170" y="1971041"/>
+            <a:ext cx="4556460" cy="3765525"/>
           </a:xfrm>
         </p:spPr>
         <p:txBody>
           <a:bodyPr>
-            <a:normAutofit fontScale="92500" lnSpcReduction="10000"/>
+            <a:normAutofit lnSpcReduction="10000"/>
           </a:bodyPr>
           <a:lstStyle/>
           <a:p>
-            <a:pPr algn="just"/>
-            <a:r>
-              <a:rPr lang="hu-HU" dirty="0">
+            <a:pPr algn="just">
+              <a:spcBef>
+                <a:spcPts val="600"/>
+              </a:spcBef>
+            </a:pPr>
+            <a:r>
+              <a:rPr lang="hu-HU" spc="100" dirty="0">
                 <a:solidFill>
                   <a:srgbClr val="F87474"/>
                 </a:solidFill>
+                <a:latin typeface="Inter" panose="02000503000000020004" pitchFamily="2" charset="0"/>
+                <a:ea typeface="Inter" panose="02000503000000020004" pitchFamily="2" charset="0"/>
               </a:rPr>
               <a:t>Kulimákokról képek elkészítése</a:t>
             </a:r>
           </a:p>
           <a:p>
-            <a:pPr algn="just"/>
-            <a:r>
-              <a:rPr lang="hu-HU" dirty="0" err="1">
+            <a:pPr algn="just">
+              <a:spcBef>
+                <a:spcPts val="600"/>
+              </a:spcBef>
+            </a:pPr>
+            <a:r>
+              <a:rPr lang="hu-HU" spc="100" dirty="0" err="1">
                 <a:solidFill>
                   <a:srgbClr val="F87474"/>
                 </a:solidFill>
+                <a:latin typeface="Inter" panose="02000503000000020004" pitchFamily="2" charset="0"/>
+                <a:ea typeface="Inter" panose="02000503000000020004" pitchFamily="2" charset="0"/>
               </a:rPr>
               <a:t>Powerpoint</a:t>
             </a:r>
             <a:r>
-              <a:rPr lang="hu-HU" dirty="0">
+              <a:rPr lang="hu-HU" spc="100" dirty="0">
                 <a:solidFill>
                   <a:srgbClr val="F87474"/>
                 </a:solidFill>
+                <a:latin typeface="Inter" panose="02000503000000020004" pitchFamily="2" charset="0"/>
+                <a:ea typeface="Inter" panose="02000503000000020004" pitchFamily="2" charset="0"/>
               </a:rPr>
               <a:t> elkészítése</a:t>
             </a:r>
           </a:p>
           <a:p>
-            <a:pPr algn="just"/>
-            <a:r>
-              <a:rPr lang="hu-HU" dirty="0">
+            <a:pPr algn="just">
+              <a:spcBef>
+                <a:spcPts val="600"/>
+              </a:spcBef>
+            </a:pPr>
+            <a:r>
+              <a:rPr lang="hu-HU" spc="100" dirty="0">
                 <a:solidFill>
                   <a:srgbClr val="F87474"/>
                 </a:solidFill>
+                <a:latin typeface="Inter" panose="02000503000000020004" pitchFamily="2" charset="0"/>
+                <a:ea typeface="Inter" panose="02000503000000020004" pitchFamily="2" charset="0"/>
               </a:rPr>
               <a:t>„A gomb” </a:t>
             </a:r>
             <a:r>
-              <a:rPr lang="hu-HU" dirty="0" err="1">
+              <a:rPr lang="hu-HU" spc="100" dirty="0" err="1">
                 <a:solidFill>
                   <a:srgbClr val="F87474"/>
                 </a:solidFill>
+                <a:latin typeface="Inter" panose="02000503000000020004" pitchFamily="2" charset="0"/>
+                <a:ea typeface="Inter" panose="02000503000000020004" pitchFamily="2" charset="0"/>
               </a:rPr>
               <a:t>desing</a:t>
             </a:r>
             <a:r>
-              <a:rPr lang="hu-HU" dirty="0">
+              <a:rPr lang="hu-HU" spc="100" dirty="0">
                 <a:solidFill>
                   <a:srgbClr val="F87474"/>
                 </a:solidFill>
+                <a:latin typeface="Inter" panose="02000503000000020004" pitchFamily="2" charset="0"/>
+                <a:ea typeface="Inter" panose="02000503000000020004" pitchFamily="2" charset="0"/>
               </a:rPr>
               <a:t> és váz</a:t>
             </a:r>
           </a:p>
           <a:p>
-            <a:pPr algn="just"/>
-            <a:r>
-              <a:rPr lang="hu-HU" dirty="0" err="1">
+            <a:pPr algn="just">
+              <a:spcBef>
+                <a:spcPts val="600"/>
+              </a:spcBef>
+            </a:pPr>
+            <a:r>
+              <a:rPr lang="hu-HU" spc="100" dirty="0" err="1">
                 <a:solidFill>
                   <a:srgbClr val="F87474"/>
                 </a:solidFill>
+                <a:latin typeface="Inter" panose="02000503000000020004" pitchFamily="2" charset="0"/>
+                <a:ea typeface="Inter" panose="02000503000000020004" pitchFamily="2" charset="0"/>
               </a:rPr>
               <a:t>Kattingatós</a:t>
             </a:r>
             <a:r>
-              <a:rPr lang="hu-HU" dirty="0">
+              <a:rPr lang="hu-HU" spc="100" dirty="0">
                 <a:solidFill>
                   <a:srgbClr val="F87474"/>
                 </a:solidFill>
+                <a:latin typeface="Inter" panose="02000503000000020004" pitchFamily="2" charset="0"/>
+                <a:ea typeface="Inter" panose="02000503000000020004" pitchFamily="2" charset="0"/>
               </a:rPr>
               <a:t> videó</a:t>
             </a:r>
           </a:p>
           <a:p>
-            <a:pPr algn="just"/>
-            <a:r>
-              <a:rPr lang="hu-HU" dirty="0">
+            <a:pPr algn="just">
+              <a:spcBef>
+                <a:spcPts val="600"/>
+              </a:spcBef>
+            </a:pPr>
+            <a:r>
+              <a:rPr lang="hu-HU" spc="100" dirty="0">
                 <a:solidFill>
                   <a:srgbClr val="F87474"/>
                 </a:solidFill>
+                <a:latin typeface="Inter" panose="02000503000000020004" pitchFamily="2" charset="0"/>
+                <a:ea typeface="Inter" panose="02000503000000020004" pitchFamily="2" charset="0"/>
               </a:rPr>
               <a:t>Az odalak tartalmi szövegének megírása</a:t>
             </a:r>
-          </a:p>
-          <a:p>
-            <a:endParaRPr lang="hu-HU" dirty="0"/>
           </a:p>
         </p:txBody>
       </p:sp>
@@ -3795,7 +3840,7 @@
         <p:spPr>
           <a:xfrm>
             <a:off x="7023876" y="6274440"/>
-            <a:ext cx="3431452" cy="369332"/>
+            <a:ext cx="3943708" cy="369332"/>
           </a:xfrm>
           <a:prstGeom prst="rect">
             <a:avLst/>
@@ -3809,14 +3854,23 @@
           <a:lstStyle/>
           <a:p>
             <a:r>
-              <a:rPr lang="hu-HU" dirty="0"/>
+              <a:rPr lang="hu-HU" dirty="0">
+                <a:latin typeface="Inter" panose="02000503000000020004" pitchFamily="2" charset="0"/>
+                <a:ea typeface="Inter" panose="02000503000000020004" pitchFamily="2" charset="0"/>
+              </a:rPr>
               <a:t>Én ahogy csinálom a </a:t>
             </a:r>
             <a:r>
-              <a:rPr lang="hu-HU" dirty="0" err="1"/>
+              <a:rPr lang="hu-HU" dirty="0" err="1">
+                <a:latin typeface="Inter" panose="02000503000000020004" pitchFamily="2" charset="0"/>
+                <a:ea typeface="Inter" panose="02000503000000020004" pitchFamily="2" charset="0"/>
+              </a:rPr>
               <a:t>powerpointot</a:t>
             </a:r>
-            <a:endParaRPr lang="hu-HU" dirty="0"/>
+            <a:endParaRPr lang="hu-HU" dirty="0">
+              <a:latin typeface="Inter" panose="02000503000000020004" pitchFamily="2" charset="0"/>
+              <a:ea typeface="Inter" panose="02000503000000020004" pitchFamily="2" charset="0"/>
+            </a:endParaRPr>
           </a:p>
         </p:txBody>
       </p:sp>
@@ -3862,8 +3916,8 @@
         </p:nvSpPr>
         <p:spPr>
           <a:xfrm>
-            <a:off x="939800" y="2745468"/>
-            <a:ext cx="10515600" cy="1325563"/>
+            <a:off x="939800" y="1820174"/>
+            <a:ext cx="10515600" cy="2250857"/>
           </a:xfrm>
         </p:spPr>
         <p:txBody>
@@ -3878,7 +3932,8 @@
                 <a:solidFill>
                   <a:srgbClr val="FFB562"/>
                 </a:solidFill>
-                <a:latin typeface="Arial" panose="020B0604020202020204" pitchFamily="34" charset="0"/>
+                <a:latin typeface="Inter" panose="02000503000000020004" pitchFamily="2" charset="0"/>
+                <a:ea typeface="Inter" panose="02000503000000020004" pitchFamily="2" charset="0"/>
                 <a:cs typeface="Arial" panose="020B0604020202020204" pitchFamily="34" charset="0"/>
               </a:rPr>
               <a:t>A közös munka értékelése</a:t>
@@ -3944,7 +3999,8 @@
                 <a:solidFill>
                   <a:srgbClr val="FFB562"/>
                 </a:solidFill>
-                <a:latin typeface="Arial" panose="020B0604020202020204" pitchFamily="34" charset="0"/>
+                <a:latin typeface="Inter" panose="02000503000000020004" pitchFamily="2" charset="0"/>
+                <a:ea typeface="Inter" panose="02000503000000020004" pitchFamily="2" charset="0"/>
                 <a:cs typeface="Arial" panose="020B0604020202020204" pitchFamily="34" charset="0"/>
               </a:rPr>
               <a:t>Köszönjük a figyelmet!</a:t>
@@ -4010,7 +4066,8 @@
                 <a:solidFill>
                   <a:srgbClr val="FFB562"/>
                 </a:solidFill>
-                <a:latin typeface="Arial" panose="020B0604020202020204" pitchFamily="34" charset="0"/>
+                <a:latin typeface="Inter" panose="02000503000000020004" pitchFamily="2" charset="0"/>
+                <a:ea typeface="Inter" panose="02000503000000020004" pitchFamily="2" charset="0"/>
                 <a:cs typeface="Arial" panose="020B0604020202020204" pitchFamily="34" charset="0"/>
               </a:rPr>
               <a:t>Tervezés</a:t>
@@ -4076,7 +4133,8 @@
                 <a:solidFill>
                   <a:srgbClr val="FFB562"/>
                 </a:solidFill>
-                <a:latin typeface="Arial" panose="020B0604020202020204" pitchFamily="34" charset="0"/>
+                <a:latin typeface="Inter" panose="02000503000000020004" pitchFamily="2" charset="0"/>
+                <a:ea typeface="Inter" panose="02000503000000020004" pitchFamily="2" charset="0"/>
                 <a:cs typeface="Arial" panose="020B0604020202020204" pitchFamily="34" charset="0"/>
               </a:rPr>
               <a:t>Sprintek megtervezése</a:t>
@@ -4169,7 +4227,8 @@
                 <a:solidFill>
                   <a:srgbClr val="FFB562"/>
                 </a:solidFill>
-                <a:latin typeface="Arial" panose="020B0604020202020204" pitchFamily="34" charset="0"/>
+                <a:latin typeface="Inter" panose="02000503000000020004" pitchFamily="2" charset="0"/>
+                <a:ea typeface="Inter" panose="02000503000000020004" pitchFamily="2" charset="0"/>
                 <a:cs typeface="Arial" panose="020B0604020202020204" pitchFamily="34" charset="0"/>
               </a:rPr>
               <a:t>Oldalak megtervezése</a:t>
@@ -4541,7 +4600,8 @@
                 <a:solidFill>
                   <a:srgbClr val="FFB562"/>
                 </a:solidFill>
-                <a:latin typeface="Arial" panose="020B0604020202020204" pitchFamily="34" charset="0"/>
+                <a:latin typeface="Inter" panose="02000503000000020004" pitchFamily="2" charset="0"/>
+                <a:ea typeface="Inter" panose="02000503000000020004" pitchFamily="2" charset="0"/>
                 <a:cs typeface="Arial" panose="020B0604020202020204" pitchFamily="34" charset="0"/>
               </a:rPr>
               <a:t>Színek megtervezése</a:t>
@@ -4586,8 +4646,8 @@
         </p:nvSpPr>
         <p:spPr>
           <a:xfrm>
-            <a:off x="9173027" y="2656114"/>
-            <a:ext cx="2394859" cy="584775"/>
+            <a:off x="9131297" y="2552598"/>
+            <a:ext cx="2755903" cy="584775"/>
           </a:xfrm>
           <a:prstGeom prst="rect">
             <a:avLst/>
@@ -4605,6 +4665,8 @@
                 <a:solidFill>
                   <a:srgbClr val="F87474"/>
                 </a:solidFill>
+                <a:latin typeface="Inter" panose="02000503000000020004" pitchFamily="2" charset="0"/>
+                <a:ea typeface="Inter" panose="02000503000000020004" pitchFamily="2" charset="0"/>
                 <a:hlinkClick r:id="rId3"/>
               </a:rPr>
               <a:t>Colorhunt.co</a:t>
@@ -4613,6 +4675,8 @@
               <a:solidFill>
                 <a:srgbClr val="F87474"/>
               </a:solidFill>
+              <a:latin typeface="Inter" panose="02000503000000020004" pitchFamily="2" charset="0"/>
+              <a:ea typeface="Inter" panose="02000503000000020004" pitchFamily="2" charset="0"/>
             </a:endParaRPr>
           </a:p>
         </p:txBody>
@@ -4673,7 +4737,8 @@
                 <a:solidFill>
                   <a:srgbClr val="FFB562"/>
                 </a:solidFill>
-                <a:latin typeface="Arial" panose="020B0604020202020204" pitchFamily="34" charset="0"/>
+                <a:latin typeface="Inter" panose="02000503000000020004" pitchFamily="2" charset="0"/>
+                <a:ea typeface="Inter" panose="02000503000000020004" pitchFamily="2" charset="0"/>
                 <a:cs typeface="Arial" panose="020B0604020202020204" pitchFamily="34" charset="0"/>
               </a:rPr>
               <a:t>Tervezés </a:t>
@@ -4683,7 +4748,8 @@
                 <a:solidFill>
                   <a:srgbClr val="FFB562"/>
                 </a:solidFill>
-                <a:latin typeface="Arial" panose="020B0604020202020204" pitchFamily="34" charset="0"/>
+                <a:latin typeface="Inter" panose="02000503000000020004" pitchFamily="2" charset="0"/>
+                <a:ea typeface="Inter" panose="02000503000000020004" pitchFamily="2" charset="0"/>
                 <a:cs typeface="Arial" panose="020B0604020202020204" pitchFamily="34" charset="0"/>
               </a:rPr>
               <a:t>paintben</a:t>
@@ -4692,7 +4758,8 @@
               <a:solidFill>
                 <a:srgbClr val="FFB562"/>
               </a:solidFill>
-              <a:latin typeface="Arial" panose="020B0604020202020204" pitchFamily="34" charset="0"/>
+              <a:latin typeface="Inter" panose="02000503000000020004" pitchFamily="2" charset="0"/>
+              <a:ea typeface="Inter" panose="02000503000000020004" pitchFamily="2" charset="0"/>
               <a:cs typeface="Arial" panose="020B0604020202020204" pitchFamily="34" charset="0"/>
             </a:endParaRPr>
           </a:p>
@@ -4778,7 +4845,8 @@
                 <a:solidFill>
                   <a:srgbClr val="FFB562"/>
                 </a:solidFill>
-                <a:latin typeface="Arial" panose="020B0604020202020204" pitchFamily="34" charset="0"/>
+                <a:latin typeface="Inter" panose="02000503000000020004" pitchFamily="2" charset="0"/>
+                <a:ea typeface="Inter" panose="02000503000000020004" pitchFamily="2" charset="0"/>
                 <a:cs typeface="Arial" panose="020B0604020202020204" pitchFamily="34" charset="0"/>
               </a:rPr>
               <a:t>A </a:t>
@@ -4788,7 +4856,8 @@
                 <a:solidFill>
                   <a:srgbClr val="FFB562"/>
                 </a:solidFill>
-                <a:latin typeface="Arial" panose="020B0604020202020204" pitchFamily="34" charset="0"/>
+                <a:latin typeface="Inter" panose="02000503000000020004" pitchFamily="2" charset="0"/>
+                <a:ea typeface="Inter" panose="02000503000000020004" pitchFamily="2" charset="0"/>
                 <a:cs typeface="Arial" panose="020B0604020202020204" pitchFamily="34" charset="0"/>
               </a:rPr>
               <a:t>scrum</a:t>
@@ -4798,7 +4867,8 @@
                 <a:solidFill>
                   <a:srgbClr val="FFB562"/>
                 </a:solidFill>
-                <a:latin typeface="Arial" panose="020B0604020202020204" pitchFamily="34" charset="0"/>
+                <a:latin typeface="Inter" panose="02000503000000020004" pitchFamily="2" charset="0"/>
+                <a:ea typeface="Inter" panose="02000503000000020004" pitchFamily="2" charset="0"/>
                 <a:cs typeface="Arial" panose="020B0604020202020204" pitchFamily="34" charset="0"/>
               </a:rPr>
               <a:t> rugalmassága</a:t>
@@ -4828,11 +4898,17 @@
           <a:p>
             <a:pPr algn="ctr"/>
             <a:r>
-              <a:rPr lang="hu-HU" dirty="0" err="1"/>
+              <a:rPr lang="hu-HU" dirty="0" err="1">
+                <a:latin typeface="Inter" panose="02000503000000020004" pitchFamily="2" charset="0"/>
+                <a:ea typeface="Inter" panose="02000503000000020004" pitchFamily="2" charset="0"/>
+              </a:rPr>
               <a:t>Paintes</a:t>
             </a:r>
             <a:r>
-              <a:rPr lang="hu-HU" dirty="0"/>
+              <a:rPr lang="hu-HU" dirty="0">
+                <a:latin typeface="Inter" panose="02000503000000020004" pitchFamily="2" charset="0"/>
+                <a:ea typeface="Inter" panose="02000503000000020004" pitchFamily="2" charset="0"/>
+              </a:rPr>
               <a:t> tervek</a:t>
             </a:r>
           </a:p>
@@ -4888,11 +4964,17 @@
           <a:p>
             <a:pPr algn="ctr"/>
             <a:r>
-              <a:rPr lang="hu-HU" dirty="0" err="1"/>
+              <a:rPr lang="hu-HU" dirty="0" err="1">
+                <a:latin typeface="Inter" panose="02000503000000020004" pitchFamily="2" charset="0"/>
+                <a:ea typeface="Inter" panose="02000503000000020004" pitchFamily="2" charset="0"/>
+              </a:rPr>
               <a:t>Figmás</a:t>
             </a:r>
             <a:r>
-              <a:rPr lang="hu-HU" dirty="0"/>
+              <a:rPr lang="hu-HU" dirty="0">
+                <a:latin typeface="Inter" panose="02000503000000020004" pitchFamily="2" charset="0"/>
+                <a:ea typeface="Inter" panose="02000503000000020004" pitchFamily="2" charset="0"/>
+              </a:rPr>
               <a:t> tervek</a:t>
             </a:r>
           </a:p>
@@ -5696,7 +5778,8 @@
                 <a:solidFill>
                   <a:srgbClr val="FFB562"/>
                 </a:solidFill>
-                <a:latin typeface="Arial" panose="020B0604020202020204" pitchFamily="34" charset="0"/>
+                <a:latin typeface="Inter" panose="02000503000000020004" pitchFamily="2" charset="0"/>
+                <a:ea typeface="Inter" panose="02000503000000020004" pitchFamily="2" charset="0"/>
                 <a:cs typeface="Arial" panose="020B0604020202020204" pitchFamily="34" charset="0"/>
               </a:rPr>
               <a:t>A projekt felépítése</a:t>
@@ -5762,7 +5845,8 @@
                 <a:solidFill>
                   <a:srgbClr val="FFB562"/>
                 </a:solidFill>
-                <a:latin typeface="Arial" panose="020B0604020202020204" pitchFamily="34" charset="0"/>
+                <a:latin typeface="Inter" panose="02000503000000020004" pitchFamily="2" charset="0"/>
+                <a:ea typeface="Inter" panose="02000503000000020004" pitchFamily="2" charset="0"/>
                 <a:cs typeface="Arial" panose="020B0604020202020204" pitchFamily="34" charset="0"/>
               </a:rPr>
               <a:t>Főoldal</a:t>

</xml_diff>

<commit_message>
A powerpoint elrendezésének kijavítása
</commit_message>
<xml_diff>
--- a/ikt projektfeladat.pptx
+++ b/ikt projektfeladat.pptx
@@ -266,7 +266,7 @@
           <a:p>
             <a:fld id="{38C4BF85-5AB0-4169-A990-10DF94846CFA}" type="datetimeFigureOut">
               <a:rPr lang="hu-HU" smtClean="0"/>
-              <a:t>2023. 02. 07.</a:t>
+              <a:t>2023. 02. 08.</a:t>
             </a:fld>
             <a:endParaRPr lang="hu-HU"/>
           </a:p>
@@ -436,7 +436,7 @@
           <a:p>
             <a:fld id="{38C4BF85-5AB0-4169-A990-10DF94846CFA}" type="datetimeFigureOut">
               <a:rPr lang="hu-HU" smtClean="0"/>
-              <a:t>2023. 02. 07.</a:t>
+              <a:t>2023. 02. 08.</a:t>
             </a:fld>
             <a:endParaRPr lang="hu-HU"/>
           </a:p>
@@ -616,7 +616,7 @@
           <a:p>
             <a:fld id="{38C4BF85-5AB0-4169-A990-10DF94846CFA}" type="datetimeFigureOut">
               <a:rPr lang="hu-HU" smtClean="0"/>
-              <a:t>2023. 02. 07.</a:t>
+              <a:t>2023. 02. 08.</a:t>
             </a:fld>
             <a:endParaRPr lang="hu-HU"/>
           </a:p>
@@ -786,7 +786,7 @@
           <a:p>
             <a:fld id="{38C4BF85-5AB0-4169-A990-10DF94846CFA}" type="datetimeFigureOut">
               <a:rPr lang="hu-HU" smtClean="0"/>
-              <a:t>2023. 02. 07.</a:t>
+              <a:t>2023. 02. 08.</a:t>
             </a:fld>
             <a:endParaRPr lang="hu-HU"/>
           </a:p>
@@ -1032,7 +1032,7 @@
           <a:p>
             <a:fld id="{38C4BF85-5AB0-4169-A990-10DF94846CFA}" type="datetimeFigureOut">
               <a:rPr lang="hu-HU" smtClean="0"/>
-              <a:t>2023. 02. 07.</a:t>
+              <a:t>2023. 02. 08.</a:t>
             </a:fld>
             <a:endParaRPr lang="hu-HU"/>
           </a:p>
@@ -1264,7 +1264,7 @@
           <a:p>
             <a:fld id="{38C4BF85-5AB0-4169-A990-10DF94846CFA}" type="datetimeFigureOut">
               <a:rPr lang="hu-HU" smtClean="0"/>
-              <a:t>2023. 02. 07.</a:t>
+              <a:t>2023. 02. 08.</a:t>
             </a:fld>
             <a:endParaRPr lang="hu-HU"/>
           </a:p>
@@ -1631,7 +1631,7 @@
           <a:p>
             <a:fld id="{38C4BF85-5AB0-4169-A990-10DF94846CFA}" type="datetimeFigureOut">
               <a:rPr lang="hu-HU" smtClean="0"/>
-              <a:t>2023. 02. 07.</a:t>
+              <a:t>2023. 02. 08.</a:t>
             </a:fld>
             <a:endParaRPr lang="hu-HU"/>
           </a:p>
@@ -1749,7 +1749,7 @@
           <a:p>
             <a:fld id="{38C4BF85-5AB0-4169-A990-10DF94846CFA}" type="datetimeFigureOut">
               <a:rPr lang="hu-HU" smtClean="0"/>
-              <a:t>2023. 02. 07.</a:t>
+              <a:t>2023. 02. 08.</a:t>
             </a:fld>
             <a:endParaRPr lang="hu-HU"/>
           </a:p>
@@ -1844,7 +1844,7 @@
           <a:p>
             <a:fld id="{38C4BF85-5AB0-4169-A990-10DF94846CFA}" type="datetimeFigureOut">
               <a:rPr lang="hu-HU" smtClean="0"/>
-              <a:t>2023. 02. 07.</a:t>
+              <a:t>2023. 02. 08.</a:t>
             </a:fld>
             <a:endParaRPr lang="hu-HU"/>
           </a:p>
@@ -2121,7 +2121,7 @@
           <a:p>
             <a:fld id="{38C4BF85-5AB0-4169-A990-10DF94846CFA}" type="datetimeFigureOut">
               <a:rPr lang="hu-HU" smtClean="0"/>
-              <a:t>2023. 02. 07.</a:t>
+              <a:t>2023. 02. 08.</a:t>
             </a:fld>
             <a:endParaRPr lang="hu-HU"/>
           </a:p>
@@ -2378,7 +2378,7 @@
           <a:p>
             <a:fld id="{38C4BF85-5AB0-4169-A990-10DF94846CFA}" type="datetimeFigureOut">
               <a:rPr lang="hu-HU" smtClean="0"/>
-              <a:t>2023. 02. 07.</a:t>
+              <a:t>2023. 02. 08.</a:t>
             </a:fld>
             <a:endParaRPr lang="hu-HU"/>
           </a:p>
@@ -2591,7 +2591,7 @@
           <a:p>
             <a:fld id="{38C4BF85-5AB0-4169-A990-10DF94846CFA}" type="datetimeFigureOut">
               <a:rPr lang="hu-HU" smtClean="0"/>
-              <a:t>2023. 02. 07.</a:t>
+              <a:t>2023. 02. 08.</a:t>
             </a:fld>
             <a:endParaRPr lang="hu-HU"/>
           </a:p>
@@ -3160,11 +3160,11 @@
   <p:clrMapOvr>
     <a:masterClrMapping/>
   </p:clrMapOvr>
-  <mc:AlternateContent xmlns:mc="http://schemas.openxmlformats.org/markup-compatibility/2006">
-    <mc:Choice xmlns:p14="http://schemas.microsoft.com/office/powerpoint/2010/main" Requires="p14">
+  <mc:AlternateContent xmlns:mc="http://schemas.openxmlformats.org/markup-compatibility/2006" xmlns:p14="http://schemas.microsoft.com/office/powerpoint/2010/main">
+    <mc:Choice Requires="p14">
       <p:transition p14:dur="10"/>
     </mc:Choice>
-    <mc:Fallback>
+    <mc:Fallback xmlns="">
       <p:transition/>
     </mc:Fallback>
   </mc:AlternateContent>
@@ -3200,13 +3200,13 @@
         </p:nvSpPr>
         <p:spPr>
           <a:xfrm>
-            <a:off x="2063342" y="2766218"/>
+            <a:off x="263557" y="3316554"/>
             <a:ext cx="8065316" cy="1325563"/>
           </a:xfrm>
         </p:spPr>
         <p:txBody>
           <a:bodyPr>
-            <a:normAutofit/>
+            <a:normAutofit fontScale="90000"/>
           </a:bodyPr>
           <a:lstStyle/>
           <a:p>
@@ -3825,13 +3825,13 @@
         </p:nvSpPr>
         <p:spPr>
           <a:xfrm>
-            <a:off x="939800" y="2745468"/>
+            <a:off x="838200" y="2766218"/>
             <a:ext cx="10515600" cy="1325563"/>
           </a:xfrm>
         </p:spPr>
         <p:txBody>
           <a:bodyPr>
-            <a:normAutofit/>
+            <a:normAutofit fontScale="90000"/>
           </a:bodyPr>
           <a:lstStyle/>
           <a:p>
@@ -4598,7 +4598,7 @@
         </p:nvSpPr>
         <p:spPr>
           <a:xfrm>
-            <a:off x="339366" y="562048"/>
+            <a:off x="330036" y="562048"/>
             <a:ext cx="6759560" cy="4622694"/>
           </a:xfrm>
         </p:spPr>
@@ -4614,7 +4614,7 @@
               </a:spcBef>
             </a:pPr>
             <a:r>
-              <a:rPr lang="hu-HU" sz="3600" b="1" spc="100" dirty="0">
+              <a:rPr lang="hu-HU" sz="3200" spc="100" dirty="0">
                 <a:solidFill>
                   <a:schemeClr val="tx2">
                     <a:lumMod val="50000"/>
@@ -4633,7 +4633,7 @@
               </a:spcBef>
             </a:pPr>
             <a:r>
-              <a:rPr lang="hu-HU" sz="3600" b="1" spc="100" dirty="0">
+              <a:rPr lang="hu-HU" sz="3200" spc="100" dirty="0">
                 <a:solidFill>
                   <a:schemeClr val="tx2">
                     <a:lumMod val="50000"/>
@@ -4652,7 +4652,7 @@
               </a:spcBef>
             </a:pPr>
             <a:r>
-              <a:rPr lang="hu-HU" sz="3600" b="1" spc="100" dirty="0">
+              <a:rPr lang="hu-HU" sz="3200" spc="100" dirty="0">
                 <a:solidFill>
                   <a:schemeClr val="tx2">
                     <a:lumMod val="50000"/>
@@ -4671,7 +4671,7 @@
               </a:spcBef>
             </a:pPr>
             <a:r>
-              <a:rPr lang="hu-HU" sz="3600" b="1" spc="100" dirty="0">
+              <a:rPr lang="hu-HU" sz="3200" spc="100" dirty="0">
                 <a:solidFill>
                   <a:schemeClr val="tx2">
                     <a:lumMod val="50000"/>
@@ -4690,7 +4690,7 @@
               </a:spcBef>
             </a:pPr>
             <a:r>
-              <a:rPr lang="hu-HU" sz="3600" b="1" spc="100" dirty="0" err="1">
+              <a:rPr lang="hu-HU" sz="3200" spc="100" dirty="0" err="1">
                 <a:solidFill>
                   <a:schemeClr val="tx2">
                     <a:lumMod val="50000"/>
@@ -4701,7 +4701,7 @@
               </a:rPr>
               <a:t>Photoshoppolás</a:t>
             </a:r>
-            <a:endParaRPr lang="hu-HU" sz="3600" b="1" spc="100" dirty="0">
+            <a:endParaRPr lang="hu-HU" sz="3200" spc="100" dirty="0">
               <a:solidFill>
                 <a:schemeClr val="tx2">
                   <a:lumMod val="50000"/>
@@ -4718,7 +4718,7 @@
               </a:spcBef>
             </a:pPr>
             <a:r>
-              <a:rPr lang="hu-HU" sz="3600" b="1" spc="100" dirty="0">
+              <a:rPr lang="hu-HU" sz="3200" spc="100" dirty="0">
                 <a:solidFill>
                   <a:schemeClr val="tx2">
                     <a:lumMod val="50000"/>
@@ -5623,7 +5623,7 @@
         <p:spPr>
           <a:xfrm>
             <a:off x="737648" y="595075"/>
-            <a:ext cx="6094428" cy="3093154"/>
+            <a:ext cx="6094428" cy="2785378"/>
           </a:xfrm>
           <a:prstGeom prst="rect">
             <a:avLst/>
@@ -5644,7 +5644,7 @@
               <a:buChar char="•"/>
             </a:pPr>
             <a:r>
-              <a:rPr lang="hu-HU" sz="3600" b="1" spc="100" dirty="0">
+              <a:rPr lang="hu-HU" sz="3200" spc="100" dirty="0">
                 <a:solidFill>
                   <a:schemeClr val="tx2">
                     <a:lumMod val="50000"/>
@@ -5665,7 +5665,7 @@
               <a:buChar char="•"/>
             </a:pPr>
             <a:r>
-              <a:rPr lang="hu-HU" sz="3600" b="1" spc="100" dirty="0">
+              <a:rPr lang="hu-HU" sz="3200" spc="100" dirty="0">
                 <a:solidFill>
                   <a:schemeClr val="tx2">
                     <a:lumMod val="50000"/>
@@ -5686,7 +5686,7 @@
               <a:buChar char="•"/>
             </a:pPr>
             <a:r>
-              <a:rPr lang="hu-HU" sz="3600" b="1" spc="100" dirty="0">
+              <a:rPr lang="hu-HU" sz="3200" spc="100" dirty="0">
                 <a:solidFill>
                   <a:schemeClr val="tx2">
                     <a:lumMod val="50000"/>
@@ -5707,7 +5707,7 @@
               <a:buChar char="•"/>
             </a:pPr>
             <a:r>
-              <a:rPr lang="hu-HU" sz="3600" b="1" spc="100" dirty="0">
+              <a:rPr lang="hu-HU" sz="3200" spc="100" dirty="0">
                 <a:solidFill>
                   <a:schemeClr val="tx2">
                     <a:lumMod val="50000"/>
@@ -6653,7 +6653,7 @@
               </a:spcBef>
             </a:pPr>
             <a:r>
-              <a:rPr lang="hu-HU" sz="3600" b="1" spc="100" dirty="0">
+              <a:rPr lang="hu-HU" sz="3200" spc="100" dirty="0">
                 <a:solidFill>
                   <a:schemeClr val="tx2">
                     <a:lumMod val="50000"/>
@@ -6672,7 +6672,7 @@
               </a:spcBef>
             </a:pPr>
             <a:r>
-              <a:rPr lang="hu-HU" sz="3600" b="1" spc="100" dirty="0">
+              <a:rPr lang="hu-HU" sz="3200" spc="100" dirty="0">
                 <a:solidFill>
                   <a:schemeClr val="tx2">
                     <a:lumMod val="50000"/>
@@ -6691,7 +6691,7 @@
               </a:spcBef>
             </a:pPr>
             <a:r>
-              <a:rPr lang="hu-HU" sz="3600" b="1" spc="100" dirty="0">
+              <a:rPr lang="hu-HU" sz="3200" spc="100" dirty="0">
                 <a:solidFill>
                   <a:schemeClr val="tx2">
                     <a:lumMod val="50000"/>
@@ -6710,7 +6710,7 @@
               </a:spcBef>
             </a:pPr>
             <a:r>
-              <a:rPr lang="hu-HU" sz="3600" b="1" spc="100" dirty="0">
+              <a:rPr lang="hu-HU" sz="3200" spc="100" dirty="0">
                 <a:solidFill>
                   <a:schemeClr val="tx2">
                     <a:lumMod val="50000"/>
@@ -6722,7 +6722,7 @@
               <a:t>„</a:t>
             </a:r>
             <a:r>
-              <a:rPr lang="hu-HU" sz="3600" b="1" spc="100" dirty="0" err="1">
+              <a:rPr lang="hu-HU" sz="3200" spc="100" dirty="0" err="1">
                 <a:solidFill>
                   <a:schemeClr val="tx2">
                     <a:lumMod val="50000"/>
@@ -6734,7 +6734,7 @@
               <a:t>Kattingatós</a:t>
             </a:r>
             <a:r>
-              <a:rPr lang="hu-HU" sz="3600" b="1" spc="100" dirty="0">
+              <a:rPr lang="hu-HU" sz="3200" spc="100" dirty="0">
                 <a:solidFill>
                   <a:schemeClr val="tx2">
                     <a:lumMod val="50000"/>
@@ -6753,7 +6753,7 @@
               </a:spcBef>
             </a:pPr>
             <a:r>
-              <a:rPr lang="hu-HU" sz="3600" b="1" spc="100" dirty="0">
+              <a:rPr lang="hu-HU" sz="3200" spc="100" dirty="0">
                 <a:solidFill>
                   <a:schemeClr val="tx2">
                     <a:lumMod val="50000"/>
@@ -6817,8 +6817,8 @@
         </p:nvSpPr>
         <p:spPr>
           <a:xfrm>
-            <a:off x="7669828" y="5251511"/>
-            <a:ext cx="4208983" cy="400110"/>
+            <a:off x="7299164" y="5326583"/>
+            <a:ext cx="4522172" cy="400110"/>
           </a:xfrm>
           <a:prstGeom prst="rect">
             <a:avLst/>
@@ -6832,7 +6832,7 @@
           <a:lstStyle/>
           <a:p>
             <a:r>
-              <a:rPr lang="hu-HU" sz="2000" b="1" dirty="0">
+              <a:rPr lang="hu-HU" sz="2000" dirty="0">
                 <a:solidFill>
                   <a:schemeClr val="tx2">
                     <a:lumMod val="50000"/>
@@ -6844,7 +6844,7 @@
               <a:t>Én ahogy csinálom a </a:t>
             </a:r>
             <a:r>
-              <a:rPr lang="hu-HU" sz="2000" b="1" dirty="0" err="1">
+              <a:rPr lang="hu-HU" sz="2000" dirty="0" err="1">
                 <a:solidFill>
                   <a:schemeClr val="tx2">
                     <a:lumMod val="50000"/>
@@ -6855,7 +6855,7 @@
               </a:rPr>
               <a:t>powerpointot</a:t>
             </a:r>
-            <a:endParaRPr lang="hu-HU" sz="2000" b="1" dirty="0">
+            <a:endParaRPr lang="hu-HU" sz="2000" dirty="0">
               <a:solidFill>
                 <a:schemeClr val="tx2">
                   <a:lumMod val="50000"/>
@@ -6968,7 +6968,7 @@
         </p:nvSpPr>
         <p:spPr>
           <a:xfrm>
-            <a:off x="1038520" y="2766218"/>
+            <a:off x="-399755" y="3350494"/>
             <a:ext cx="10114960" cy="1325563"/>
           </a:xfrm>
           <a:effectLst/>
@@ -7432,7 +7432,7 @@
         </p:nvSpPr>
         <p:spPr>
           <a:xfrm>
-            <a:off x="0" y="2766218"/>
+            <a:off x="838200" y="2766218"/>
             <a:ext cx="10515600" cy="1325563"/>
           </a:xfrm>
         </p:spPr>
@@ -7544,7 +7544,7 @@
         </p:blipFill>
         <p:spPr>
           <a:xfrm>
-            <a:off x="9627674" y="2448648"/>
+            <a:off x="186054" y="5877650"/>
             <a:ext cx="1304292" cy="980350"/>
           </a:xfrm>
           <a:prstGeom prst="rect">
@@ -8089,8 +8089,8 @@
         </p:nvSpPr>
         <p:spPr>
           <a:xfrm>
-            <a:off x="3892625" y="2766218"/>
-            <a:ext cx="4406750" cy="1325563"/>
+            <a:off x="3892624" y="2766218"/>
+            <a:ext cx="4870375" cy="1325563"/>
           </a:xfrm>
           <a:effectLst/>
         </p:spPr>

</xml_diff>